<commit_message>
Add some comments for reference
</commit_message>
<xml_diff>
--- a/record.pptx
+++ b/record.pptx
@@ -257,7 +257,7 @@
           <a:p>
             <a:fld id="{BD371D8B-6EEF-4666-9EDE-D125F1A89B84}" type="datetimeFigureOut">
               <a:rPr lang="en-US" smtClean="0"/>
-              <a:t>9/30/2017</a:t>
+              <a:t>10/2/2017</a:t>
             </a:fld>
             <a:endParaRPr lang="en-US"/>
           </a:p>
@@ -425,7 +425,7 @@
           <a:p>
             <a:fld id="{BD371D8B-6EEF-4666-9EDE-D125F1A89B84}" type="datetimeFigureOut">
               <a:rPr lang="en-US" smtClean="0"/>
-              <a:t>9/30/2017</a:t>
+              <a:t>10/2/2017</a:t>
             </a:fld>
             <a:endParaRPr lang="en-US"/>
           </a:p>
@@ -603,7 +603,7 @@
           <a:p>
             <a:fld id="{BD371D8B-6EEF-4666-9EDE-D125F1A89B84}" type="datetimeFigureOut">
               <a:rPr lang="en-US" smtClean="0"/>
-              <a:t>9/30/2017</a:t>
+              <a:t>10/2/2017</a:t>
             </a:fld>
             <a:endParaRPr lang="en-US"/>
           </a:p>
@@ -771,7 +771,7 @@
           <a:p>
             <a:fld id="{BD371D8B-6EEF-4666-9EDE-D125F1A89B84}" type="datetimeFigureOut">
               <a:rPr lang="en-US" smtClean="0"/>
-              <a:t>9/30/2017</a:t>
+              <a:t>10/2/2017</a:t>
             </a:fld>
             <a:endParaRPr lang="en-US"/>
           </a:p>
@@ -1016,7 +1016,7 @@
           <a:p>
             <a:fld id="{BD371D8B-6EEF-4666-9EDE-D125F1A89B84}" type="datetimeFigureOut">
               <a:rPr lang="en-US" smtClean="0"/>
-              <a:t>9/30/2017</a:t>
+              <a:t>10/2/2017</a:t>
             </a:fld>
             <a:endParaRPr lang="en-US"/>
           </a:p>
@@ -1245,7 +1245,7 @@
           <a:p>
             <a:fld id="{BD371D8B-6EEF-4666-9EDE-D125F1A89B84}" type="datetimeFigureOut">
               <a:rPr lang="en-US" smtClean="0"/>
-              <a:t>9/30/2017</a:t>
+              <a:t>10/2/2017</a:t>
             </a:fld>
             <a:endParaRPr lang="en-US"/>
           </a:p>
@@ -1609,7 +1609,7 @@
           <a:p>
             <a:fld id="{BD371D8B-6EEF-4666-9EDE-D125F1A89B84}" type="datetimeFigureOut">
               <a:rPr lang="en-US" smtClean="0"/>
-              <a:t>9/30/2017</a:t>
+              <a:t>10/2/2017</a:t>
             </a:fld>
             <a:endParaRPr lang="en-US"/>
           </a:p>
@@ -1726,7 +1726,7 @@
           <a:p>
             <a:fld id="{BD371D8B-6EEF-4666-9EDE-D125F1A89B84}" type="datetimeFigureOut">
               <a:rPr lang="en-US" smtClean="0"/>
-              <a:t>9/30/2017</a:t>
+              <a:t>10/2/2017</a:t>
             </a:fld>
             <a:endParaRPr lang="en-US"/>
           </a:p>
@@ -1821,7 +1821,7 @@
           <a:p>
             <a:fld id="{BD371D8B-6EEF-4666-9EDE-D125F1A89B84}" type="datetimeFigureOut">
               <a:rPr lang="en-US" smtClean="0"/>
-              <a:t>9/30/2017</a:t>
+              <a:t>10/2/2017</a:t>
             </a:fld>
             <a:endParaRPr lang="en-US"/>
           </a:p>
@@ -2096,7 +2096,7 @@
           <a:p>
             <a:fld id="{BD371D8B-6EEF-4666-9EDE-D125F1A89B84}" type="datetimeFigureOut">
               <a:rPr lang="en-US" smtClean="0"/>
-              <a:t>9/30/2017</a:t>
+              <a:t>10/2/2017</a:t>
             </a:fld>
             <a:endParaRPr lang="en-US"/>
           </a:p>
@@ -2348,7 +2348,7 @@
           <a:p>
             <a:fld id="{BD371D8B-6EEF-4666-9EDE-D125F1A89B84}" type="datetimeFigureOut">
               <a:rPr lang="en-US" smtClean="0"/>
-              <a:t>9/30/2017</a:t>
+              <a:t>10/2/2017</a:t>
             </a:fld>
             <a:endParaRPr lang="en-US"/>
           </a:p>
@@ -2559,7 +2559,7 @@
           <a:p>
             <a:fld id="{BD371D8B-6EEF-4666-9EDE-D125F1A89B84}" type="datetimeFigureOut">
               <a:rPr lang="en-US" smtClean="0"/>
-              <a:t>9/30/2017</a:t>
+              <a:t>10/2/2017</a:t>
             </a:fld>
             <a:endParaRPr lang="en-US"/>
           </a:p>
@@ -3135,7 +3135,7 @@
         </p:nvSpPr>
         <p:spPr>
           <a:xfrm>
-            <a:off x="2576050" y="1696160"/>
+            <a:off x="2831688" y="1735165"/>
             <a:ext cx="1612491" cy="369332"/>
           </a:xfrm>
           <a:prstGeom prst="rect">
@@ -3150,8 +3150,12 @@
           <a:lstStyle/>
           <a:p>
             <a:r>
+              <a:rPr lang="en-US" dirty="0" err="1"/>
+              <a:t>ToolBar</a:t>
+            </a:r>
+            <a:r>
               <a:rPr lang="en-US" dirty="0"/>
-              <a:t>Button Panel</a:t>
+              <a:t> (Panel)</a:t>
             </a:r>
           </a:p>
         </p:txBody>
@@ -3211,7 +3215,7 @@
         </p:nvSpPr>
         <p:spPr>
           <a:xfrm>
-            <a:off x="2576050" y="5264552"/>
+            <a:off x="2662871" y="5252214"/>
             <a:ext cx="2123769" cy="369332"/>
           </a:xfrm>
           <a:prstGeom prst="rect">
@@ -3227,7 +3231,15 @@
           <a:p>
             <a:r>
               <a:rPr lang="en-US" dirty="0"/>
-              <a:t>Message Panel</a:t>
+              <a:t>Message (</a:t>
+            </a:r>
+            <a:r>
+              <a:rPr lang="en-US" dirty="0" err="1"/>
+              <a:t>TextPane</a:t>
+            </a:r>
+            <a:r>
+              <a:rPr lang="en-US" dirty="0"/>
+              <a:t>)</a:t>
             </a:r>
           </a:p>
         </p:txBody>
@@ -3286,8 +3298,8 @@
         </p:nvSpPr>
         <p:spPr>
           <a:xfrm>
-            <a:off x="2777611" y="3244334"/>
-            <a:ext cx="1410930" cy="369332"/>
+            <a:off x="2932468" y="3121100"/>
+            <a:ext cx="1410930" cy="646331"/>
           </a:xfrm>
           <a:prstGeom prst="rect">
             <a:avLst/>
@@ -3301,8 +3313,20 @@
           <a:lstStyle/>
           <a:p>
             <a:r>
+              <a:rPr lang="en-US" dirty="0" err="1"/>
+              <a:t>EditDisplay</a:t>
+            </a:r>
+            <a:r>
               <a:rPr lang="en-US" dirty="0"/>
-              <a:t>Main Panel</a:t>
+              <a:t> (</a:t>
+            </a:r>
+            <a:r>
+              <a:rPr lang="en-US" dirty="0" err="1"/>
+              <a:t>TextPane</a:t>
+            </a:r>
+            <a:r>
+              <a:rPr lang="en-US" dirty="0"/>
+              <a:t>)</a:t>
             </a:r>
           </a:p>
         </p:txBody>
@@ -3316,7 +3340,7 @@
         <p:spPr>
           <a:xfrm>
             <a:off x="7256301" y="3074010"/>
-            <a:ext cx="1612491" cy="369332"/>
+            <a:ext cx="1612491" cy="646331"/>
           </a:xfrm>
           <a:prstGeom prst="rect">
             <a:avLst/>
@@ -3331,7 +3355,15 @@
           <a:p>
             <a:r>
               <a:rPr lang="en-US" dirty="0"/>
-              <a:t>Search Panel</a:t>
+              <a:t>Search (</a:t>
+            </a:r>
+            <a:r>
+              <a:rPr lang="en-US" dirty="0" err="1"/>
+              <a:t>TextPane</a:t>
+            </a:r>
+            <a:r>
+              <a:rPr lang="en-US" dirty="0"/>
+              <a:t>)</a:t>
             </a:r>
           </a:p>
         </p:txBody>
@@ -3371,7 +3403,7 @@
           <p:cNvPr id="2" name="Title 1">
             <a:extLst>
               <a:ext uri="{FF2B5EF4-FFF2-40B4-BE49-F238E27FC236}">
-                <a16:creationId xmlns:a16="http://schemas.microsoft.com/office/drawing/2014/main" id="{057A1603-A347-44E4-9FE3-0880CBA392DF}"/>
+                <a16:creationId xmlns:a16="http://schemas.microsoft.com/office/drawing/2014/main" xmlns="" id="{057A1603-A347-44E4-9FE3-0880CBA392DF}"/>
               </a:ext>
             </a:extLst>
           </p:cNvPr>
@@ -3399,7 +3431,7 @@
           <p:cNvPr id="5" name="TextBox 4">
             <a:extLst>
               <a:ext uri="{FF2B5EF4-FFF2-40B4-BE49-F238E27FC236}">
-                <a16:creationId xmlns:a16="http://schemas.microsoft.com/office/drawing/2014/main" id="{A0F9B324-8F3E-403A-9AC4-F7308ED423B5}"/>
+                <a16:creationId xmlns:a16="http://schemas.microsoft.com/office/drawing/2014/main" xmlns="" id="{A0F9B324-8F3E-403A-9AC4-F7308ED423B5}"/>
               </a:ext>
             </a:extLst>
           </p:cNvPr>
@@ -3408,7 +3440,7 @@
         </p:nvSpPr>
         <p:spPr>
           <a:xfrm>
-            <a:off x="4731312" y="1321356"/>
+            <a:off x="4731312" y="1376152"/>
             <a:ext cx="1850065" cy="369332"/>
           </a:xfrm>
           <a:prstGeom prst="rect">
@@ -3435,7 +3467,7 @@
           <p:cNvPr id="6" name="TextBox 5">
             <a:extLst>
               <a:ext uri="{FF2B5EF4-FFF2-40B4-BE49-F238E27FC236}">
-                <a16:creationId xmlns:a16="http://schemas.microsoft.com/office/drawing/2014/main" id="{6542935A-8021-4B2F-B427-B65304AECF70}"/>
+                <a16:creationId xmlns:a16="http://schemas.microsoft.com/office/drawing/2014/main" xmlns="" id="{6542935A-8021-4B2F-B427-B65304AECF70}"/>
               </a:ext>
             </a:extLst>
           </p:cNvPr>
@@ -3444,7 +3476,7 @@
         </p:nvSpPr>
         <p:spPr>
           <a:xfrm>
-            <a:off x="3640010" y="2096827"/>
+            <a:off x="4731312" y="2132052"/>
             <a:ext cx="1335626" cy="369332"/>
           </a:xfrm>
           <a:prstGeom prst="rect">
@@ -3471,7 +3503,7 @@
           <p:cNvPr id="8" name="Straight Arrow Connector 7">
             <a:extLst>
               <a:ext uri="{FF2B5EF4-FFF2-40B4-BE49-F238E27FC236}">
-                <a16:creationId xmlns:a16="http://schemas.microsoft.com/office/drawing/2014/main" id="{588DDB9A-AB95-4FA6-8B6B-D0F37161E799}"/>
+                <a16:creationId xmlns:a16="http://schemas.microsoft.com/office/drawing/2014/main" xmlns="" id="{588DDB9A-AB95-4FA6-8B6B-D0F37161E799}"/>
               </a:ext>
             </a:extLst>
           </p:cNvPr>
@@ -3510,7 +3542,7 @@
           <p:cNvPr id="9" name="Straight Arrow Connector 8">
             <a:extLst>
               <a:ext uri="{FF2B5EF4-FFF2-40B4-BE49-F238E27FC236}">
-                <a16:creationId xmlns:a16="http://schemas.microsoft.com/office/drawing/2014/main" id="{8BD7C6A1-E004-4EF2-ACEA-6E23EBA31929}"/>
+                <a16:creationId xmlns:a16="http://schemas.microsoft.com/office/drawing/2014/main" xmlns="" id="{8BD7C6A1-E004-4EF2-ACEA-6E23EBA31929}"/>
               </a:ext>
             </a:extLst>
           </p:cNvPr>
@@ -3522,7 +3554,7 @@
         <p:spPr>
           <a:xfrm>
             <a:off x="1387903" y="1945869"/>
-            <a:ext cx="6510227" cy="0"/>
+            <a:ext cx="8225790" cy="0"/>
           </a:xfrm>
           <a:prstGeom prst="straightConnector1">
             <a:avLst/>
@@ -3551,7 +3583,7 @@
           <p:cNvPr id="13" name="Straight Arrow Connector 12">
             <a:extLst>
               <a:ext uri="{FF2B5EF4-FFF2-40B4-BE49-F238E27FC236}">
-                <a16:creationId xmlns:a16="http://schemas.microsoft.com/office/drawing/2014/main" id="{F711FFF0-01CE-4D8B-BF49-78842A10A5CD}"/>
+                <a16:creationId xmlns:a16="http://schemas.microsoft.com/office/drawing/2014/main" xmlns="" id="{F711FFF0-01CE-4D8B-BF49-78842A10A5CD}"/>
               </a:ext>
             </a:extLst>
           </p:cNvPr>
@@ -3590,7 +3622,7 @@
           <p:cNvPr id="15" name="TextBox 14">
             <a:extLst>
               <a:ext uri="{FF2B5EF4-FFF2-40B4-BE49-F238E27FC236}">
-                <a16:creationId xmlns:a16="http://schemas.microsoft.com/office/drawing/2014/main" id="{20FBF2E3-F78B-437F-A383-84C582914762}"/>
+                <a16:creationId xmlns:a16="http://schemas.microsoft.com/office/drawing/2014/main" xmlns="" id="{20FBF2E3-F78B-437F-A383-84C582914762}"/>
               </a:ext>
             </a:extLst>
           </p:cNvPr>
@@ -3625,7 +3657,7 @@
           <p:cNvPr id="16" name="Straight Arrow Connector 15">
             <a:extLst>
               <a:ext uri="{FF2B5EF4-FFF2-40B4-BE49-F238E27FC236}">
-                <a16:creationId xmlns:a16="http://schemas.microsoft.com/office/drawing/2014/main" id="{D9A37250-405D-4730-A685-5EFAD89FE27F}"/>
+                <a16:creationId xmlns:a16="http://schemas.microsoft.com/office/drawing/2014/main" xmlns="" id="{D9A37250-405D-4730-A685-5EFAD89FE27F}"/>
               </a:ext>
             </a:extLst>
           </p:cNvPr>
@@ -3634,7 +3666,7 @@
         </p:nvCxnSpPr>
         <p:spPr>
           <a:xfrm>
-            <a:off x="2534713" y="1965738"/>
+            <a:off x="3049063" y="1985650"/>
             <a:ext cx="0" cy="255181"/>
           </a:xfrm>
           <a:prstGeom prst="straightConnector1">
@@ -3664,7 +3696,7 @@
           <p:cNvPr id="17" name="TextBox 16">
             <a:extLst>
               <a:ext uri="{FF2B5EF4-FFF2-40B4-BE49-F238E27FC236}">
-                <a16:creationId xmlns:a16="http://schemas.microsoft.com/office/drawing/2014/main" id="{FE27B8C7-B2C6-49F3-97BC-B84445243323}"/>
+                <a16:creationId xmlns:a16="http://schemas.microsoft.com/office/drawing/2014/main" xmlns="" id="{FE27B8C7-B2C6-49F3-97BC-B84445243323}"/>
               </a:ext>
             </a:extLst>
           </p:cNvPr>
@@ -3673,7 +3705,7 @@
         </p:nvSpPr>
         <p:spPr>
           <a:xfrm>
-            <a:off x="2208381" y="2132052"/>
+            <a:off x="2572746" y="2132052"/>
             <a:ext cx="952633" cy="369332"/>
           </a:xfrm>
           <a:prstGeom prst="rect">
@@ -3700,7 +3732,7 @@
           <p:cNvPr id="18" name="TextBox 17">
             <a:extLst>
               <a:ext uri="{FF2B5EF4-FFF2-40B4-BE49-F238E27FC236}">
-                <a16:creationId xmlns:a16="http://schemas.microsoft.com/office/drawing/2014/main" id="{49D66CEC-0D8C-4A37-8DE0-258FD857FEBB}"/>
+                <a16:creationId xmlns:a16="http://schemas.microsoft.com/office/drawing/2014/main" xmlns="" id="{49D66CEC-0D8C-4A37-8DE0-258FD857FEBB}"/>
               </a:ext>
             </a:extLst>
           </p:cNvPr>
@@ -3709,7 +3741,7 @@
         </p:nvSpPr>
         <p:spPr>
           <a:xfrm>
-            <a:off x="4988531" y="2093328"/>
+            <a:off x="7355070" y="2113242"/>
             <a:ext cx="1335626" cy="369332"/>
           </a:xfrm>
           <a:prstGeom prst="rect">
@@ -3735,7 +3767,7 @@
           <p:cNvPr id="19" name="TextBox 18">
             <a:extLst>
               <a:ext uri="{FF2B5EF4-FFF2-40B4-BE49-F238E27FC236}">
-                <a16:creationId xmlns:a16="http://schemas.microsoft.com/office/drawing/2014/main" id="{60D3B66F-4276-4B29-8E0F-EF00C7C3D2C4}"/>
+                <a16:creationId xmlns:a16="http://schemas.microsoft.com/office/drawing/2014/main" xmlns="" id="{60D3B66F-4276-4B29-8E0F-EF00C7C3D2C4}"/>
               </a:ext>
             </a:extLst>
           </p:cNvPr>
@@ -3744,7 +3776,7 @@
         </p:nvSpPr>
         <p:spPr>
           <a:xfrm>
-            <a:off x="6096000" y="2099743"/>
+            <a:off x="9277970" y="2083669"/>
             <a:ext cx="1335626" cy="369332"/>
           </a:xfrm>
           <a:prstGeom prst="rect">
@@ -3760,8 +3792,239 @@
           <a:p>
             <a:r>
               <a:rPr lang="en-US" dirty="0"/>
-              <a:t>Status</a:t>
-            </a:r>
+              <a:t>Message</a:t>
+            </a:r>
+          </a:p>
+        </p:txBody>
+      </p:sp>
+      <p:cxnSp>
+        <p:nvCxnSpPr>
+          <p:cNvPr id="20" name="Straight Arrow Connector 19">
+            <a:extLst>
+              <a:ext uri="{FF2B5EF4-FFF2-40B4-BE49-F238E27FC236}">
+                <a16:creationId xmlns:a16="http://schemas.microsoft.com/office/drawing/2014/main" xmlns="" id="{D2EE6BF4-3DBA-420C-824E-60B1F06199DC}"/>
+              </a:ext>
+            </a:extLst>
+          </p:cNvPr>
+          <p:cNvCxnSpPr/>
+          <p:nvPr/>
+        </p:nvCxnSpPr>
+        <p:spPr>
+          <a:xfrm>
+            <a:off x="5214206" y="1985651"/>
+            <a:ext cx="0" cy="255181"/>
+          </a:xfrm>
+          <a:prstGeom prst="straightConnector1">
+            <a:avLst/>
+          </a:prstGeom>
+          <a:ln w="31750">
+            <a:tailEnd type="triangle"/>
+          </a:ln>
+        </p:spPr>
+        <p:style>
+          <a:lnRef idx="2">
+            <a:schemeClr val="accent5"/>
+          </a:lnRef>
+          <a:fillRef idx="0">
+            <a:schemeClr val="accent5"/>
+          </a:fillRef>
+          <a:effectRef idx="1">
+            <a:schemeClr val="accent5"/>
+          </a:effectRef>
+          <a:fontRef idx="minor">
+            <a:schemeClr val="tx1"/>
+          </a:fontRef>
+        </p:style>
+      </p:cxnSp>
+      <p:cxnSp>
+        <p:nvCxnSpPr>
+          <p:cNvPr id="21" name="Straight Arrow Connector 20">
+            <a:extLst>
+              <a:ext uri="{FF2B5EF4-FFF2-40B4-BE49-F238E27FC236}">
+                <a16:creationId xmlns:a16="http://schemas.microsoft.com/office/drawing/2014/main" xmlns="" id="{28D3130E-3168-46F9-94FF-B187D9E6F7EF}"/>
+              </a:ext>
+            </a:extLst>
+          </p:cNvPr>
+          <p:cNvCxnSpPr/>
+          <p:nvPr/>
+        </p:nvCxnSpPr>
+        <p:spPr>
+          <a:xfrm>
+            <a:off x="7788703" y="1926418"/>
+            <a:ext cx="0" cy="255181"/>
+          </a:xfrm>
+          <a:prstGeom prst="straightConnector1">
+            <a:avLst/>
+          </a:prstGeom>
+          <a:ln w="31750">
+            <a:tailEnd type="triangle"/>
+          </a:ln>
+        </p:spPr>
+        <p:style>
+          <a:lnRef idx="2">
+            <a:schemeClr val="accent5"/>
+          </a:lnRef>
+          <a:fillRef idx="0">
+            <a:schemeClr val="accent5"/>
+          </a:fillRef>
+          <a:effectRef idx="1">
+            <a:schemeClr val="accent5"/>
+          </a:effectRef>
+          <a:fontRef idx="minor">
+            <a:schemeClr val="tx1"/>
+          </a:fontRef>
+        </p:style>
+      </p:cxnSp>
+      <p:cxnSp>
+        <p:nvCxnSpPr>
+          <p:cNvPr id="22" name="Straight Arrow Connector 21">
+            <a:extLst>
+              <a:ext uri="{FF2B5EF4-FFF2-40B4-BE49-F238E27FC236}">
+                <a16:creationId xmlns:a16="http://schemas.microsoft.com/office/drawing/2014/main" xmlns="" id="{A00E8B28-5D28-4E20-9DF8-C59A86642C42}"/>
+              </a:ext>
+            </a:extLst>
+          </p:cNvPr>
+          <p:cNvCxnSpPr/>
+          <p:nvPr/>
+        </p:nvCxnSpPr>
+        <p:spPr>
+          <a:xfrm>
+            <a:off x="9613693" y="1928457"/>
+            <a:ext cx="0" cy="255181"/>
+          </a:xfrm>
+          <a:prstGeom prst="straightConnector1">
+            <a:avLst/>
+          </a:prstGeom>
+          <a:ln w="31750">
+            <a:tailEnd type="triangle"/>
+          </a:ln>
+        </p:spPr>
+        <p:style>
+          <a:lnRef idx="2">
+            <a:schemeClr val="accent5"/>
+          </a:lnRef>
+          <a:fillRef idx="0">
+            <a:schemeClr val="accent5"/>
+          </a:fillRef>
+          <a:effectRef idx="1">
+            <a:schemeClr val="accent5"/>
+          </a:effectRef>
+          <a:fontRef idx="minor">
+            <a:schemeClr val="tx1"/>
+          </a:fontRef>
+        </p:style>
+      </p:cxnSp>
+      <p:cxnSp>
+        <p:nvCxnSpPr>
+          <p:cNvPr id="23" name="Straight Arrow Connector 22">
+            <a:extLst>
+              <a:ext uri="{FF2B5EF4-FFF2-40B4-BE49-F238E27FC236}">
+                <a16:creationId xmlns:a16="http://schemas.microsoft.com/office/drawing/2014/main" xmlns="" id="{588DDB9A-AB95-4FA6-8B6B-D0F37161E799}"/>
+              </a:ext>
+            </a:extLst>
+          </p:cNvPr>
+          <p:cNvCxnSpPr/>
+          <p:nvPr/>
+        </p:nvCxnSpPr>
+        <p:spPr>
+          <a:xfrm>
+            <a:off x="9613693" y="2354983"/>
+            <a:ext cx="0" cy="2998252"/>
+          </a:xfrm>
+          <a:prstGeom prst="straightConnector1">
+            <a:avLst/>
+          </a:prstGeom>
+          <a:ln w="31750">
+            <a:tailEnd type="triangle"/>
+          </a:ln>
+        </p:spPr>
+        <p:style>
+          <a:lnRef idx="2">
+            <a:schemeClr val="accent5"/>
+          </a:lnRef>
+          <a:fillRef idx="0">
+            <a:schemeClr val="accent5"/>
+          </a:fillRef>
+          <a:effectRef idx="1">
+            <a:schemeClr val="accent5"/>
+          </a:effectRef>
+          <a:fontRef idx="minor">
+            <a:schemeClr val="tx1"/>
+          </a:fontRef>
+        </p:style>
+      </p:cxnSp>
+      <p:cxnSp>
+        <p:nvCxnSpPr>
+          <p:cNvPr id="24" name="Straight Arrow Connector 23">
+            <a:extLst>
+              <a:ext uri="{FF2B5EF4-FFF2-40B4-BE49-F238E27FC236}">
+                <a16:creationId xmlns:a16="http://schemas.microsoft.com/office/drawing/2014/main" xmlns="" id="{588DDB9A-AB95-4FA6-8B6B-D0F37161E799}"/>
+              </a:ext>
+            </a:extLst>
+          </p:cNvPr>
+          <p:cNvCxnSpPr/>
+          <p:nvPr/>
+        </p:nvCxnSpPr>
+        <p:spPr>
+          <a:xfrm flipV="1">
+            <a:off x="9614423" y="2624346"/>
+            <a:ext cx="446381" cy="6294"/>
+          </a:xfrm>
+          <a:prstGeom prst="straightConnector1">
+            <a:avLst/>
+          </a:prstGeom>
+          <a:ln w="31750">
+            <a:tailEnd type="triangle"/>
+          </a:ln>
+        </p:spPr>
+        <p:style>
+          <a:lnRef idx="2">
+            <a:schemeClr val="accent5"/>
+          </a:lnRef>
+          <a:fillRef idx="0">
+            <a:schemeClr val="accent5"/>
+          </a:fillRef>
+          <a:effectRef idx="1">
+            <a:schemeClr val="accent5"/>
+          </a:effectRef>
+          <a:fontRef idx="minor">
+            <a:schemeClr val="tx1"/>
+          </a:fontRef>
+        </p:style>
+      </p:cxnSp>
+      <p:sp>
+        <p:nvSpPr>
+          <p:cNvPr id="25" name="TextBox 24">
+            <a:extLst>
+              <a:ext uri="{FF2B5EF4-FFF2-40B4-BE49-F238E27FC236}">
+                <a16:creationId xmlns:a16="http://schemas.microsoft.com/office/drawing/2014/main" xmlns="" id="{60D3B66F-4276-4B29-8E0F-EF00C7C3D2C4}"/>
+              </a:ext>
+            </a:extLst>
+          </p:cNvPr>
+          <p:cNvSpPr txBox="1"/>
+          <p:nvPr/>
+        </p:nvSpPr>
+        <p:spPr>
+          <a:xfrm>
+            <a:off x="10200967" y="2360502"/>
+            <a:ext cx="1335626" cy="646331"/>
+          </a:xfrm>
+          <a:prstGeom prst="rect">
+            <a:avLst/>
+          </a:prstGeom>
+          <a:noFill/>
+        </p:spPr>
+        <p:txBody>
+          <a:bodyPr wrap="square" rtlCol="0">
+            <a:spAutoFit/>
+          </a:bodyPr>
+          <a:lstStyle/>
+          <a:p>
+            <a:r>
+              <a:rPr lang="en-US" dirty="0" smtClean="0"/>
+              <a:t>Display Message</a:t>
+            </a:r>
+            <a:endParaRPr lang="en-US" dirty="0"/>
           </a:p>
         </p:txBody>
       </p:sp>

</xml_diff>

<commit_message>
Add one file and change several files
</commit_message>
<xml_diff>
--- a/record.pptx
+++ b/record.pptx
@@ -7,6 +7,9 @@
   <p:sldIdLst>
     <p:sldId id="256" r:id="rId2"/>
     <p:sldId id="257" r:id="rId3"/>
+    <p:sldId id="259" r:id="rId4"/>
+    <p:sldId id="260" r:id="rId5"/>
+    <p:sldId id="261" r:id="rId6"/>
   </p:sldIdLst>
   <p:sldSz cx="12192000" cy="6858000"/>
   <p:notesSz cx="6858000" cy="9144000"/>
@@ -257,7 +260,7 @@
           <a:p>
             <a:fld id="{BD371D8B-6EEF-4666-9EDE-D125F1A89B84}" type="datetimeFigureOut">
               <a:rPr lang="en-US" smtClean="0"/>
-              <a:t>10/4/2017</a:t>
+              <a:t>11/10/2017</a:t>
             </a:fld>
             <a:endParaRPr lang="en-US"/>
           </a:p>
@@ -425,7 +428,7 @@
           <a:p>
             <a:fld id="{BD371D8B-6EEF-4666-9EDE-D125F1A89B84}" type="datetimeFigureOut">
               <a:rPr lang="en-US" smtClean="0"/>
-              <a:t>10/4/2017</a:t>
+              <a:t>11/10/2017</a:t>
             </a:fld>
             <a:endParaRPr lang="en-US"/>
           </a:p>
@@ -603,7 +606,7 @@
           <a:p>
             <a:fld id="{BD371D8B-6EEF-4666-9EDE-D125F1A89B84}" type="datetimeFigureOut">
               <a:rPr lang="en-US" smtClean="0"/>
-              <a:t>10/4/2017</a:t>
+              <a:t>11/10/2017</a:t>
             </a:fld>
             <a:endParaRPr lang="en-US"/>
           </a:p>
@@ -771,7 +774,7 @@
           <a:p>
             <a:fld id="{BD371D8B-6EEF-4666-9EDE-D125F1A89B84}" type="datetimeFigureOut">
               <a:rPr lang="en-US" smtClean="0"/>
-              <a:t>10/4/2017</a:t>
+              <a:t>11/10/2017</a:t>
             </a:fld>
             <a:endParaRPr lang="en-US"/>
           </a:p>
@@ -1016,7 +1019,7 @@
           <a:p>
             <a:fld id="{BD371D8B-6EEF-4666-9EDE-D125F1A89B84}" type="datetimeFigureOut">
               <a:rPr lang="en-US" smtClean="0"/>
-              <a:t>10/4/2017</a:t>
+              <a:t>11/10/2017</a:t>
             </a:fld>
             <a:endParaRPr lang="en-US"/>
           </a:p>
@@ -1245,7 +1248,7 @@
           <a:p>
             <a:fld id="{BD371D8B-6EEF-4666-9EDE-D125F1A89B84}" type="datetimeFigureOut">
               <a:rPr lang="en-US" smtClean="0"/>
-              <a:t>10/4/2017</a:t>
+              <a:t>11/10/2017</a:t>
             </a:fld>
             <a:endParaRPr lang="en-US"/>
           </a:p>
@@ -1609,7 +1612,7 @@
           <a:p>
             <a:fld id="{BD371D8B-6EEF-4666-9EDE-D125F1A89B84}" type="datetimeFigureOut">
               <a:rPr lang="en-US" smtClean="0"/>
-              <a:t>10/4/2017</a:t>
+              <a:t>11/10/2017</a:t>
             </a:fld>
             <a:endParaRPr lang="en-US"/>
           </a:p>
@@ -1726,7 +1729,7 @@
           <a:p>
             <a:fld id="{BD371D8B-6EEF-4666-9EDE-D125F1A89B84}" type="datetimeFigureOut">
               <a:rPr lang="en-US" smtClean="0"/>
-              <a:t>10/4/2017</a:t>
+              <a:t>11/10/2017</a:t>
             </a:fld>
             <a:endParaRPr lang="en-US"/>
           </a:p>
@@ -1821,7 +1824,7 @@
           <a:p>
             <a:fld id="{BD371D8B-6EEF-4666-9EDE-D125F1A89B84}" type="datetimeFigureOut">
               <a:rPr lang="en-US" smtClean="0"/>
-              <a:t>10/4/2017</a:t>
+              <a:t>11/10/2017</a:t>
             </a:fld>
             <a:endParaRPr lang="en-US"/>
           </a:p>
@@ -2096,7 +2099,7 @@
           <a:p>
             <a:fld id="{BD371D8B-6EEF-4666-9EDE-D125F1A89B84}" type="datetimeFigureOut">
               <a:rPr lang="en-US" smtClean="0"/>
-              <a:t>10/4/2017</a:t>
+              <a:t>11/10/2017</a:t>
             </a:fld>
             <a:endParaRPr lang="en-US"/>
           </a:p>
@@ -2348,7 +2351,7 @@
           <a:p>
             <a:fld id="{BD371D8B-6EEF-4666-9EDE-D125F1A89B84}" type="datetimeFigureOut">
               <a:rPr lang="en-US" smtClean="0"/>
-              <a:t>10/4/2017</a:t>
+              <a:t>11/10/2017</a:t>
             </a:fld>
             <a:endParaRPr lang="en-US"/>
           </a:p>
@@ -2559,7 +2562,7 @@
           <a:p>
             <a:fld id="{BD371D8B-6EEF-4666-9EDE-D125F1A89B84}" type="datetimeFigureOut">
               <a:rPr lang="en-US" smtClean="0"/>
-              <a:t>10/4/2017</a:t>
+              <a:t>11/10/2017</a:t>
             </a:fld>
             <a:endParaRPr lang="en-US"/>
           </a:p>
@@ -3403,7 +3406,7 @@
           <p:cNvPr id="2" name="Title 1">
             <a:extLst>
               <a:ext uri="{FF2B5EF4-FFF2-40B4-BE49-F238E27FC236}">
-                <a16:creationId xmlns="" xmlns:a16="http://schemas.microsoft.com/office/drawing/2014/main" id="{057A1603-A347-44E4-9FE3-0880CBA392DF}"/>
+                <a16:creationId xmlns:a16="http://schemas.microsoft.com/office/drawing/2014/main" xmlns="" id="{057A1603-A347-44E4-9FE3-0880CBA392DF}"/>
               </a:ext>
             </a:extLst>
           </p:cNvPr>
@@ -3436,7 +3439,7 @@
           <p:cNvPr id="5" name="TextBox 4">
             <a:extLst>
               <a:ext uri="{FF2B5EF4-FFF2-40B4-BE49-F238E27FC236}">
-                <a16:creationId xmlns="" xmlns:a16="http://schemas.microsoft.com/office/drawing/2014/main" id="{A0F9B324-8F3E-403A-9AC4-F7308ED423B5}"/>
+                <a16:creationId xmlns:a16="http://schemas.microsoft.com/office/drawing/2014/main" xmlns="" id="{A0F9B324-8F3E-403A-9AC4-F7308ED423B5}"/>
               </a:ext>
             </a:extLst>
           </p:cNvPr>
@@ -3472,7 +3475,7 @@
           <p:cNvPr id="6" name="TextBox 5">
             <a:extLst>
               <a:ext uri="{FF2B5EF4-FFF2-40B4-BE49-F238E27FC236}">
-                <a16:creationId xmlns="" xmlns:a16="http://schemas.microsoft.com/office/drawing/2014/main" id="{6542935A-8021-4B2F-B427-B65304AECF70}"/>
+                <a16:creationId xmlns:a16="http://schemas.microsoft.com/office/drawing/2014/main" xmlns="" id="{6542935A-8021-4B2F-B427-B65304AECF70}"/>
               </a:ext>
             </a:extLst>
           </p:cNvPr>
@@ -3508,7 +3511,7 @@
           <p:cNvPr id="8" name="Straight Arrow Connector 7">
             <a:extLst>
               <a:ext uri="{FF2B5EF4-FFF2-40B4-BE49-F238E27FC236}">
-                <a16:creationId xmlns="" xmlns:a16="http://schemas.microsoft.com/office/drawing/2014/main" id="{588DDB9A-AB95-4FA6-8B6B-D0F37161E799}"/>
+                <a16:creationId xmlns:a16="http://schemas.microsoft.com/office/drawing/2014/main" xmlns="" id="{588DDB9A-AB95-4FA6-8B6B-D0F37161E799}"/>
               </a:ext>
             </a:extLst>
           </p:cNvPr>
@@ -3547,7 +3550,7 @@
           <p:cNvPr id="9" name="Straight Arrow Connector 8">
             <a:extLst>
               <a:ext uri="{FF2B5EF4-FFF2-40B4-BE49-F238E27FC236}">
-                <a16:creationId xmlns="" xmlns:a16="http://schemas.microsoft.com/office/drawing/2014/main" id="{8BD7C6A1-E004-4EF2-ACEA-6E23EBA31929}"/>
+                <a16:creationId xmlns:a16="http://schemas.microsoft.com/office/drawing/2014/main" xmlns="" id="{8BD7C6A1-E004-4EF2-ACEA-6E23EBA31929}"/>
               </a:ext>
             </a:extLst>
           </p:cNvPr>
@@ -3588,7 +3591,7 @@
           <p:cNvPr id="13" name="Straight Arrow Connector 12">
             <a:extLst>
               <a:ext uri="{FF2B5EF4-FFF2-40B4-BE49-F238E27FC236}">
-                <a16:creationId xmlns="" xmlns:a16="http://schemas.microsoft.com/office/drawing/2014/main" id="{F711FFF0-01CE-4D8B-BF49-78842A10A5CD}"/>
+                <a16:creationId xmlns:a16="http://schemas.microsoft.com/office/drawing/2014/main" xmlns="" id="{F711FFF0-01CE-4D8B-BF49-78842A10A5CD}"/>
               </a:ext>
             </a:extLst>
           </p:cNvPr>
@@ -3627,7 +3630,7 @@
           <p:cNvPr id="15" name="TextBox 14">
             <a:extLst>
               <a:ext uri="{FF2B5EF4-FFF2-40B4-BE49-F238E27FC236}">
-                <a16:creationId xmlns="" xmlns:a16="http://schemas.microsoft.com/office/drawing/2014/main" id="{20FBF2E3-F78B-437F-A383-84C582914762}"/>
+                <a16:creationId xmlns:a16="http://schemas.microsoft.com/office/drawing/2014/main" xmlns="" id="{20FBF2E3-F78B-437F-A383-84C582914762}"/>
               </a:ext>
             </a:extLst>
           </p:cNvPr>
@@ -3662,7 +3665,7 @@
           <p:cNvPr id="16" name="Straight Arrow Connector 15">
             <a:extLst>
               <a:ext uri="{FF2B5EF4-FFF2-40B4-BE49-F238E27FC236}">
-                <a16:creationId xmlns="" xmlns:a16="http://schemas.microsoft.com/office/drawing/2014/main" id="{D9A37250-405D-4730-A685-5EFAD89FE27F}"/>
+                <a16:creationId xmlns:a16="http://schemas.microsoft.com/office/drawing/2014/main" xmlns="" id="{D9A37250-405D-4730-A685-5EFAD89FE27F}"/>
               </a:ext>
             </a:extLst>
           </p:cNvPr>
@@ -3701,7 +3704,7 @@
           <p:cNvPr id="17" name="TextBox 16">
             <a:extLst>
               <a:ext uri="{FF2B5EF4-FFF2-40B4-BE49-F238E27FC236}">
-                <a16:creationId xmlns="" xmlns:a16="http://schemas.microsoft.com/office/drawing/2014/main" id="{FE27B8C7-B2C6-49F3-97BC-B84445243323}"/>
+                <a16:creationId xmlns:a16="http://schemas.microsoft.com/office/drawing/2014/main" xmlns="" id="{FE27B8C7-B2C6-49F3-97BC-B84445243323}"/>
               </a:ext>
             </a:extLst>
           </p:cNvPr>
@@ -3737,7 +3740,7 @@
           <p:cNvPr id="18" name="TextBox 17">
             <a:extLst>
               <a:ext uri="{FF2B5EF4-FFF2-40B4-BE49-F238E27FC236}">
-                <a16:creationId xmlns="" xmlns:a16="http://schemas.microsoft.com/office/drawing/2014/main" id="{49D66CEC-0D8C-4A37-8DE0-258FD857FEBB}"/>
+                <a16:creationId xmlns:a16="http://schemas.microsoft.com/office/drawing/2014/main" xmlns="" id="{49D66CEC-0D8C-4A37-8DE0-258FD857FEBB}"/>
               </a:ext>
             </a:extLst>
           </p:cNvPr>
@@ -3772,7 +3775,7 @@
           <p:cNvPr id="19" name="TextBox 18">
             <a:extLst>
               <a:ext uri="{FF2B5EF4-FFF2-40B4-BE49-F238E27FC236}">
-                <a16:creationId xmlns="" xmlns:a16="http://schemas.microsoft.com/office/drawing/2014/main" id="{60D3B66F-4276-4B29-8E0F-EF00C7C3D2C4}"/>
+                <a16:creationId xmlns:a16="http://schemas.microsoft.com/office/drawing/2014/main" xmlns="" id="{60D3B66F-4276-4B29-8E0F-EF00C7C3D2C4}"/>
               </a:ext>
             </a:extLst>
           </p:cNvPr>
@@ -3807,7 +3810,7 @@
           <p:cNvPr id="20" name="Straight Arrow Connector 19">
             <a:extLst>
               <a:ext uri="{FF2B5EF4-FFF2-40B4-BE49-F238E27FC236}">
-                <a16:creationId xmlns="" xmlns:a16="http://schemas.microsoft.com/office/drawing/2014/main" id="{D2EE6BF4-3DBA-420C-824E-60B1F06199DC}"/>
+                <a16:creationId xmlns:a16="http://schemas.microsoft.com/office/drawing/2014/main" xmlns="" id="{D2EE6BF4-3DBA-420C-824E-60B1F06199DC}"/>
               </a:ext>
             </a:extLst>
           </p:cNvPr>
@@ -3846,7 +3849,7 @@
           <p:cNvPr id="21" name="Straight Arrow Connector 20">
             <a:extLst>
               <a:ext uri="{FF2B5EF4-FFF2-40B4-BE49-F238E27FC236}">
-                <a16:creationId xmlns="" xmlns:a16="http://schemas.microsoft.com/office/drawing/2014/main" id="{28D3130E-3168-46F9-94FF-B187D9E6F7EF}"/>
+                <a16:creationId xmlns:a16="http://schemas.microsoft.com/office/drawing/2014/main" xmlns="" id="{28D3130E-3168-46F9-94FF-B187D9E6F7EF}"/>
               </a:ext>
             </a:extLst>
           </p:cNvPr>
@@ -3885,7 +3888,7 @@
           <p:cNvPr id="22" name="Straight Arrow Connector 21">
             <a:extLst>
               <a:ext uri="{FF2B5EF4-FFF2-40B4-BE49-F238E27FC236}">
-                <a16:creationId xmlns="" xmlns:a16="http://schemas.microsoft.com/office/drawing/2014/main" id="{A00E8B28-5D28-4E20-9DF8-C59A86642C42}"/>
+                <a16:creationId xmlns:a16="http://schemas.microsoft.com/office/drawing/2014/main" xmlns="" id="{A00E8B28-5D28-4E20-9DF8-C59A86642C42}"/>
               </a:ext>
             </a:extLst>
           </p:cNvPr>
@@ -3924,7 +3927,7 @@
           <p:cNvPr id="23" name="Straight Arrow Connector 22">
             <a:extLst>
               <a:ext uri="{FF2B5EF4-FFF2-40B4-BE49-F238E27FC236}">
-                <a16:creationId xmlns="" xmlns:a16="http://schemas.microsoft.com/office/drawing/2014/main" id="{588DDB9A-AB95-4FA6-8B6B-D0F37161E799}"/>
+                <a16:creationId xmlns:a16="http://schemas.microsoft.com/office/drawing/2014/main" xmlns="" id="{588DDB9A-AB95-4FA6-8B6B-D0F37161E799}"/>
               </a:ext>
             </a:extLst>
           </p:cNvPr>
@@ -3963,7 +3966,7 @@
           <p:cNvPr id="24" name="Straight Arrow Connector 23">
             <a:extLst>
               <a:ext uri="{FF2B5EF4-FFF2-40B4-BE49-F238E27FC236}">
-                <a16:creationId xmlns="" xmlns:a16="http://schemas.microsoft.com/office/drawing/2014/main" id="{588DDB9A-AB95-4FA6-8B6B-D0F37161E799}"/>
+                <a16:creationId xmlns:a16="http://schemas.microsoft.com/office/drawing/2014/main" xmlns="" id="{588DDB9A-AB95-4FA6-8B6B-D0F37161E799}"/>
               </a:ext>
             </a:extLst>
           </p:cNvPr>
@@ -4002,7 +4005,7 @@
           <p:cNvPr id="25" name="TextBox 24">
             <a:extLst>
               <a:ext uri="{FF2B5EF4-FFF2-40B4-BE49-F238E27FC236}">
-                <a16:creationId xmlns="" xmlns:a16="http://schemas.microsoft.com/office/drawing/2014/main" id="{60D3B66F-4276-4B29-8E0F-EF00C7C3D2C4}"/>
+                <a16:creationId xmlns:a16="http://schemas.microsoft.com/office/drawing/2014/main" xmlns="" id="{60D3B66F-4276-4B29-8E0F-EF00C7C3D2C4}"/>
               </a:ext>
             </a:extLst>
           </p:cNvPr>
@@ -4038,7 +4041,7 @@
           <p:cNvPr id="26" name="Straight Arrow Connector 25">
             <a:extLst>
               <a:ext uri="{FF2B5EF4-FFF2-40B4-BE49-F238E27FC236}">
-                <a16:creationId xmlns="" xmlns:a16="http://schemas.microsoft.com/office/drawing/2014/main" id="{588DDB9A-AB95-4FA6-8B6B-D0F37161E799}"/>
+                <a16:creationId xmlns:a16="http://schemas.microsoft.com/office/drawing/2014/main" xmlns="" id="{588DDB9A-AB95-4FA6-8B6B-D0F37161E799}"/>
               </a:ext>
             </a:extLst>
           </p:cNvPr>
@@ -4077,7 +4080,7 @@
           <p:cNvPr id="27" name="Straight Arrow Connector 26">
             <a:extLst>
               <a:ext uri="{FF2B5EF4-FFF2-40B4-BE49-F238E27FC236}">
-                <a16:creationId xmlns="" xmlns:a16="http://schemas.microsoft.com/office/drawing/2014/main" id="{588DDB9A-AB95-4FA6-8B6B-D0F37161E799}"/>
+                <a16:creationId xmlns:a16="http://schemas.microsoft.com/office/drawing/2014/main" xmlns="" id="{588DDB9A-AB95-4FA6-8B6B-D0F37161E799}"/>
               </a:ext>
             </a:extLst>
           </p:cNvPr>
@@ -4116,7 +4119,7 @@
           <p:cNvPr id="28" name="TextBox 27">
             <a:extLst>
               <a:ext uri="{FF2B5EF4-FFF2-40B4-BE49-F238E27FC236}">
-                <a16:creationId xmlns="" xmlns:a16="http://schemas.microsoft.com/office/drawing/2014/main" id="{20FBF2E3-F78B-437F-A383-84C582914762}"/>
+                <a16:creationId xmlns:a16="http://schemas.microsoft.com/office/drawing/2014/main" xmlns="" id="{20FBF2E3-F78B-437F-A383-84C582914762}"/>
               </a:ext>
             </a:extLst>
           </p:cNvPr>
@@ -4152,7 +4155,7 @@
           <p:cNvPr id="29" name="Straight Arrow Connector 28">
             <a:extLst>
               <a:ext uri="{FF2B5EF4-FFF2-40B4-BE49-F238E27FC236}">
-                <a16:creationId xmlns="" xmlns:a16="http://schemas.microsoft.com/office/drawing/2014/main" id="{588DDB9A-AB95-4FA6-8B6B-D0F37161E799}"/>
+                <a16:creationId xmlns:a16="http://schemas.microsoft.com/office/drawing/2014/main" xmlns="" id="{588DDB9A-AB95-4FA6-8B6B-D0F37161E799}"/>
               </a:ext>
             </a:extLst>
           </p:cNvPr>
@@ -4191,7 +4194,7 @@
           <p:cNvPr id="30" name="Straight Arrow Connector 29">
             <a:extLst>
               <a:ext uri="{FF2B5EF4-FFF2-40B4-BE49-F238E27FC236}">
-                <a16:creationId xmlns="" xmlns:a16="http://schemas.microsoft.com/office/drawing/2014/main" id="{588DDB9A-AB95-4FA6-8B6B-D0F37161E799}"/>
+                <a16:creationId xmlns:a16="http://schemas.microsoft.com/office/drawing/2014/main" xmlns="" id="{588DDB9A-AB95-4FA6-8B6B-D0F37161E799}"/>
               </a:ext>
             </a:extLst>
           </p:cNvPr>
@@ -4230,7 +4233,7 @@
           <p:cNvPr id="31" name="TextBox 30">
             <a:extLst>
               <a:ext uri="{FF2B5EF4-FFF2-40B4-BE49-F238E27FC236}">
-                <a16:creationId xmlns="" xmlns:a16="http://schemas.microsoft.com/office/drawing/2014/main" id="{20FBF2E3-F78B-437F-A383-84C582914762}"/>
+                <a16:creationId xmlns:a16="http://schemas.microsoft.com/office/drawing/2014/main" xmlns="" id="{20FBF2E3-F78B-437F-A383-84C582914762}"/>
               </a:ext>
             </a:extLst>
           </p:cNvPr>
@@ -4266,7 +4269,7 @@
           <p:cNvPr id="33" name="Straight Arrow Connector 32">
             <a:extLst>
               <a:ext uri="{FF2B5EF4-FFF2-40B4-BE49-F238E27FC236}">
-                <a16:creationId xmlns="" xmlns:a16="http://schemas.microsoft.com/office/drawing/2014/main" id="{588DDB9A-AB95-4FA6-8B6B-D0F37161E799}"/>
+                <a16:creationId xmlns:a16="http://schemas.microsoft.com/office/drawing/2014/main" xmlns="" id="{588DDB9A-AB95-4FA6-8B6B-D0F37161E799}"/>
               </a:ext>
             </a:extLst>
           </p:cNvPr>
@@ -4305,7 +4308,7 @@
           <p:cNvPr id="34" name="TextBox 33">
             <a:extLst>
               <a:ext uri="{FF2B5EF4-FFF2-40B4-BE49-F238E27FC236}">
-                <a16:creationId xmlns="" xmlns:a16="http://schemas.microsoft.com/office/drawing/2014/main" id="{20FBF2E3-F78B-437F-A383-84C582914762}"/>
+                <a16:creationId xmlns:a16="http://schemas.microsoft.com/office/drawing/2014/main" xmlns="" id="{20FBF2E3-F78B-437F-A383-84C582914762}"/>
               </a:ext>
             </a:extLst>
           </p:cNvPr>
@@ -4341,7 +4344,7 @@
           <p:cNvPr id="35" name="Straight Arrow Connector 34">
             <a:extLst>
               <a:ext uri="{FF2B5EF4-FFF2-40B4-BE49-F238E27FC236}">
-                <a16:creationId xmlns="" xmlns:a16="http://schemas.microsoft.com/office/drawing/2014/main" id="{588DDB9A-AB95-4FA6-8B6B-D0F37161E799}"/>
+                <a16:creationId xmlns:a16="http://schemas.microsoft.com/office/drawing/2014/main" xmlns="" id="{588DDB9A-AB95-4FA6-8B6B-D0F37161E799}"/>
               </a:ext>
             </a:extLst>
           </p:cNvPr>
@@ -4380,7 +4383,7 @@
           <p:cNvPr id="36" name="TextBox 35">
             <a:extLst>
               <a:ext uri="{FF2B5EF4-FFF2-40B4-BE49-F238E27FC236}">
-                <a16:creationId xmlns="" xmlns:a16="http://schemas.microsoft.com/office/drawing/2014/main" id="{20FBF2E3-F78B-437F-A383-84C582914762}"/>
+                <a16:creationId xmlns:a16="http://schemas.microsoft.com/office/drawing/2014/main" xmlns="" id="{20FBF2E3-F78B-437F-A383-84C582914762}"/>
               </a:ext>
             </a:extLst>
           </p:cNvPr>
@@ -4416,7 +4419,7 @@
           <p:cNvPr id="37" name="Straight Arrow Connector 36">
             <a:extLst>
               <a:ext uri="{FF2B5EF4-FFF2-40B4-BE49-F238E27FC236}">
-                <a16:creationId xmlns="" xmlns:a16="http://schemas.microsoft.com/office/drawing/2014/main" id="{588DDB9A-AB95-4FA6-8B6B-D0F37161E799}"/>
+                <a16:creationId xmlns:a16="http://schemas.microsoft.com/office/drawing/2014/main" xmlns="" id="{588DDB9A-AB95-4FA6-8B6B-D0F37161E799}"/>
               </a:ext>
             </a:extLst>
           </p:cNvPr>
@@ -4455,7 +4458,7 @@
           <p:cNvPr id="38" name="TextBox 37">
             <a:extLst>
               <a:ext uri="{FF2B5EF4-FFF2-40B4-BE49-F238E27FC236}">
-                <a16:creationId xmlns="" xmlns:a16="http://schemas.microsoft.com/office/drawing/2014/main" id="{20FBF2E3-F78B-437F-A383-84C582914762}"/>
+                <a16:creationId xmlns:a16="http://schemas.microsoft.com/office/drawing/2014/main" xmlns="" id="{20FBF2E3-F78B-437F-A383-84C582914762}"/>
               </a:ext>
             </a:extLst>
           </p:cNvPr>
@@ -4491,7 +4494,7 @@
           <p:cNvPr id="39" name="Straight Arrow Connector 38">
             <a:extLst>
               <a:ext uri="{FF2B5EF4-FFF2-40B4-BE49-F238E27FC236}">
-                <a16:creationId xmlns="" xmlns:a16="http://schemas.microsoft.com/office/drawing/2014/main" id="{588DDB9A-AB95-4FA6-8B6B-D0F37161E799}"/>
+                <a16:creationId xmlns:a16="http://schemas.microsoft.com/office/drawing/2014/main" xmlns="" id="{588DDB9A-AB95-4FA6-8B6B-D0F37161E799}"/>
               </a:ext>
             </a:extLst>
           </p:cNvPr>
@@ -4530,7 +4533,7 @@
           <p:cNvPr id="40" name="TextBox 39">
             <a:extLst>
               <a:ext uri="{FF2B5EF4-FFF2-40B4-BE49-F238E27FC236}">
-                <a16:creationId xmlns="" xmlns:a16="http://schemas.microsoft.com/office/drawing/2014/main" id="{20FBF2E3-F78B-437F-A383-84C582914762}"/>
+                <a16:creationId xmlns:a16="http://schemas.microsoft.com/office/drawing/2014/main" xmlns="" id="{20FBF2E3-F78B-437F-A383-84C582914762}"/>
               </a:ext>
             </a:extLst>
           </p:cNvPr>
@@ -4566,7 +4569,7 @@
           <p:cNvPr id="41" name="Straight Arrow Connector 40">
             <a:extLst>
               <a:ext uri="{FF2B5EF4-FFF2-40B4-BE49-F238E27FC236}">
-                <a16:creationId xmlns="" xmlns:a16="http://schemas.microsoft.com/office/drawing/2014/main" id="{588DDB9A-AB95-4FA6-8B6B-D0F37161E799}"/>
+                <a16:creationId xmlns:a16="http://schemas.microsoft.com/office/drawing/2014/main" xmlns="" id="{588DDB9A-AB95-4FA6-8B6B-D0F37161E799}"/>
               </a:ext>
             </a:extLst>
           </p:cNvPr>
@@ -4605,7 +4608,7 @@
           <p:cNvPr id="42" name="TextBox 41">
             <a:extLst>
               <a:ext uri="{FF2B5EF4-FFF2-40B4-BE49-F238E27FC236}">
-                <a16:creationId xmlns="" xmlns:a16="http://schemas.microsoft.com/office/drawing/2014/main" id="{20FBF2E3-F78B-437F-A383-84C582914762}"/>
+                <a16:creationId xmlns:a16="http://schemas.microsoft.com/office/drawing/2014/main" xmlns="" id="{20FBF2E3-F78B-437F-A383-84C582914762}"/>
               </a:ext>
             </a:extLst>
           </p:cNvPr>
@@ -4641,7 +4644,7 @@
           <p:cNvPr id="43" name="Straight Arrow Connector 42">
             <a:extLst>
               <a:ext uri="{FF2B5EF4-FFF2-40B4-BE49-F238E27FC236}">
-                <a16:creationId xmlns="" xmlns:a16="http://schemas.microsoft.com/office/drawing/2014/main" id="{588DDB9A-AB95-4FA6-8B6B-D0F37161E799}"/>
+                <a16:creationId xmlns:a16="http://schemas.microsoft.com/office/drawing/2014/main" xmlns="" id="{588DDB9A-AB95-4FA6-8B6B-D0F37161E799}"/>
               </a:ext>
             </a:extLst>
           </p:cNvPr>
@@ -4680,7 +4683,7 @@
           <p:cNvPr id="44" name="Straight Arrow Connector 43">
             <a:extLst>
               <a:ext uri="{FF2B5EF4-FFF2-40B4-BE49-F238E27FC236}">
-                <a16:creationId xmlns="" xmlns:a16="http://schemas.microsoft.com/office/drawing/2014/main" id="{588DDB9A-AB95-4FA6-8B6B-D0F37161E799}"/>
+                <a16:creationId xmlns:a16="http://schemas.microsoft.com/office/drawing/2014/main" xmlns="" id="{588DDB9A-AB95-4FA6-8B6B-D0F37161E799}"/>
               </a:ext>
             </a:extLst>
           </p:cNvPr>
@@ -4719,7 +4722,7 @@
           <p:cNvPr id="45" name="TextBox 44">
             <a:extLst>
               <a:ext uri="{FF2B5EF4-FFF2-40B4-BE49-F238E27FC236}">
-                <a16:creationId xmlns="" xmlns:a16="http://schemas.microsoft.com/office/drawing/2014/main" id="{20FBF2E3-F78B-437F-A383-84C582914762}"/>
+                <a16:creationId xmlns:a16="http://schemas.microsoft.com/office/drawing/2014/main" xmlns="" id="{20FBF2E3-F78B-437F-A383-84C582914762}"/>
               </a:ext>
             </a:extLst>
           </p:cNvPr>
@@ -4755,7 +4758,7 @@
           <p:cNvPr id="46" name="Straight Arrow Connector 45">
             <a:extLst>
               <a:ext uri="{FF2B5EF4-FFF2-40B4-BE49-F238E27FC236}">
-                <a16:creationId xmlns="" xmlns:a16="http://schemas.microsoft.com/office/drawing/2014/main" id="{588DDB9A-AB95-4FA6-8B6B-D0F37161E799}"/>
+                <a16:creationId xmlns:a16="http://schemas.microsoft.com/office/drawing/2014/main" xmlns="" id="{588DDB9A-AB95-4FA6-8B6B-D0F37161E799}"/>
               </a:ext>
             </a:extLst>
           </p:cNvPr>
@@ -4794,7 +4797,7 @@
           <p:cNvPr id="47" name="TextBox 46">
             <a:extLst>
               <a:ext uri="{FF2B5EF4-FFF2-40B4-BE49-F238E27FC236}">
-                <a16:creationId xmlns="" xmlns:a16="http://schemas.microsoft.com/office/drawing/2014/main" id="{20FBF2E3-F78B-437F-A383-84C582914762}"/>
+                <a16:creationId xmlns:a16="http://schemas.microsoft.com/office/drawing/2014/main" xmlns="" id="{20FBF2E3-F78B-437F-A383-84C582914762}"/>
               </a:ext>
             </a:extLst>
           </p:cNvPr>
@@ -4830,7 +4833,7 @@
           <p:cNvPr id="48" name="Straight Arrow Connector 47">
             <a:extLst>
               <a:ext uri="{FF2B5EF4-FFF2-40B4-BE49-F238E27FC236}">
-                <a16:creationId xmlns="" xmlns:a16="http://schemas.microsoft.com/office/drawing/2014/main" id="{588DDB9A-AB95-4FA6-8B6B-D0F37161E799}"/>
+                <a16:creationId xmlns:a16="http://schemas.microsoft.com/office/drawing/2014/main" xmlns="" id="{588DDB9A-AB95-4FA6-8B6B-D0F37161E799}"/>
               </a:ext>
             </a:extLst>
           </p:cNvPr>
@@ -4869,7 +4872,7 @@
           <p:cNvPr id="49" name="TextBox 48">
             <a:extLst>
               <a:ext uri="{FF2B5EF4-FFF2-40B4-BE49-F238E27FC236}">
-                <a16:creationId xmlns="" xmlns:a16="http://schemas.microsoft.com/office/drawing/2014/main" id="{20FBF2E3-F78B-437F-A383-84C582914762}"/>
+                <a16:creationId xmlns:a16="http://schemas.microsoft.com/office/drawing/2014/main" xmlns="" id="{20FBF2E3-F78B-437F-A383-84C582914762}"/>
               </a:ext>
             </a:extLst>
           </p:cNvPr>
@@ -4905,7 +4908,7 @@
           <p:cNvPr id="50" name="Straight Arrow Connector 49">
             <a:extLst>
               <a:ext uri="{FF2B5EF4-FFF2-40B4-BE49-F238E27FC236}">
-                <a16:creationId xmlns="" xmlns:a16="http://schemas.microsoft.com/office/drawing/2014/main" id="{588DDB9A-AB95-4FA6-8B6B-D0F37161E799}"/>
+                <a16:creationId xmlns:a16="http://schemas.microsoft.com/office/drawing/2014/main" xmlns="" id="{588DDB9A-AB95-4FA6-8B6B-D0F37161E799}"/>
               </a:ext>
             </a:extLst>
           </p:cNvPr>
@@ -4944,7 +4947,7 @@
           <p:cNvPr id="51" name="TextBox 50">
             <a:extLst>
               <a:ext uri="{FF2B5EF4-FFF2-40B4-BE49-F238E27FC236}">
-                <a16:creationId xmlns="" xmlns:a16="http://schemas.microsoft.com/office/drawing/2014/main" id="{20FBF2E3-F78B-437F-A383-84C582914762}"/>
+                <a16:creationId xmlns:a16="http://schemas.microsoft.com/office/drawing/2014/main" xmlns="" id="{20FBF2E3-F78B-437F-A383-84C582914762}"/>
               </a:ext>
             </a:extLst>
           </p:cNvPr>
@@ -4980,7 +4983,7 @@
           <p:cNvPr id="52" name="Straight Arrow Connector 51">
             <a:extLst>
               <a:ext uri="{FF2B5EF4-FFF2-40B4-BE49-F238E27FC236}">
-                <a16:creationId xmlns="" xmlns:a16="http://schemas.microsoft.com/office/drawing/2014/main" id="{588DDB9A-AB95-4FA6-8B6B-D0F37161E799}"/>
+                <a16:creationId xmlns:a16="http://schemas.microsoft.com/office/drawing/2014/main" xmlns="" id="{588DDB9A-AB95-4FA6-8B6B-D0F37161E799}"/>
               </a:ext>
             </a:extLst>
           </p:cNvPr>
@@ -5019,7 +5022,7 @@
           <p:cNvPr id="53" name="TextBox 52">
             <a:extLst>
               <a:ext uri="{FF2B5EF4-FFF2-40B4-BE49-F238E27FC236}">
-                <a16:creationId xmlns="" xmlns:a16="http://schemas.microsoft.com/office/drawing/2014/main" id="{20FBF2E3-F78B-437F-A383-84C582914762}"/>
+                <a16:creationId xmlns:a16="http://schemas.microsoft.com/office/drawing/2014/main" xmlns="" id="{20FBF2E3-F78B-437F-A383-84C582914762}"/>
               </a:ext>
             </a:extLst>
           </p:cNvPr>
@@ -5055,7 +5058,7 @@
           <p:cNvPr id="54" name="Straight Arrow Connector 53">
             <a:extLst>
               <a:ext uri="{FF2B5EF4-FFF2-40B4-BE49-F238E27FC236}">
-                <a16:creationId xmlns="" xmlns:a16="http://schemas.microsoft.com/office/drawing/2014/main" id="{588DDB9A-AB95-4FA6-8B6B-D0F37161E799}"/>
+                <a16:creationId xmlns:a16="http://schemas.microsoft.com/office/drawing/2014/main" xmlns="" id="{588DDB9A-AB95-4FA6-8B6B-D0F37161E799}"/>
               </a:ext>
             </a:extLst>
           </p:cNvPr>
@@ -5094,7 +5097,7 @@
           <p:cNvPr id="55" name="TextBox 54">
             <a:extLst>
               <a:ext uri="{FF2B5EF4-FFF2-40B4-BE49-F238E27FC236}">
-                <a16:creationId xmlns="" xmlns:a16="http://schemas.microsoft.com/office/drawing/2014/main" id="{20FBF2E3-F78B-437F-A383-84C582914762}"/>
+                <a16:creationId xmlns:a16="http://schemas.microsoft.com/office/drawing/2014/main" xmlns="" id="{20FBF2E3-F78B-437F-A383-84C582914762}"/>
               </a:ext>
             </a:extLst>
           </p:cNvPr>
@@ -5130,7 +5133,7 @@
           <p:cNvPr id="56" name="Straight Arrow Connector 55">
             <a:extLst>
               <a:ext uri="{FF2B5EF4-FFF2-40B4-BE49-F238E27FC236}">
-                <a16:creationId xmlns="" xmlns:a16="http://schemas.microsoft.com/office/drawing/2014/main" id="{588DDB9A-AB95-4FA6-8B6B-D0F37161E799}"/>
+                <a16:creationId xmlns:a16="http://schemas.microsoft.com/office/drawing/2014/main" xmlns="" id="{588DDB9A-AB95-4FA6-8B6B-D0F37161E799}"/>
               </a:ext>
             </a:extLst>
           </p:cNvPr>
@@ -5169,7 +5172,7 @@
           <p:cNvPr id="57" name="Straight Arrow Connector 56">
             <a:extLst>
               <a:ext uri="{FF2B5EF4-FFF2-40B4-BE49-F238E27FC236}">
-                <a16:creationId xmlns="" xmlns:a16="http://schemas.microsoft.com/office/drawing/2014/main" id="{588DDB9A-AB95-4FA6-8B6B-D0F37161E799}"/>
+                <a16:creationId xmlns:a16="http://schemas.microsoft.com/office/drawing/2014/main" xmlns="" id="{588DDB9A-AB95-4FA6-8B6B-D0F37161E799}"/>
               </a:ext>
             </a:extLst>
           </p:cNvPr>
@@ -5208,7 +5211,7 @@
           <p:cNvPr id="58" name="Straight Arrow Connector 57">
             <a:extLst>
               <a:ext uri="{FF2B5EF4-FFF2-40B4-BE49-F238E27FC236}">
-                <a16:creationId xmlns="" xmlns:a16="http://schemas.microsoft.com/office/drawing/2014/main" id="{588DDB9A-AB95-4FA6-8B6B-D0F37161E799}"/>
+                <a16:creationId xmlns:a16="http://schemas.microsoft.com/office/drawing/2014/main" xmlns="" id="{588DDB9A-AB95-4FA6-8B6B-D0F37161E799}"/>
               </a:ext>
             </a:extLst>
           </p:cNvPr>
@@ -5247,7 +5250,7 @@
           <p:cNvPr id="59" name="TextBox 58">
             <a:extLst>
               <a:ext uri="{FF2B5EF4-FFF2-40B4-BE49-F238E27FC236}">
-                <a16:creationId xmlns="" xmlns:a16="http://schemas.microsoft.com/office/drawing/2014/main" id="{20FBF2E3-F78B-437F-A383-84C582914762}"/>
+                <a16:creationId xmlns:a16="http://schemas.microsoft.com/office/drawing/2014/main" xmlns="" id="{20FBF2E3-F78B-437F-A383-84C582914762}"/>
               </a:ext>
             </a:extLst>
           </p:cNvPr>
@@ -5283,7 +5286,7 @@
           <p:cNvPr id="60" name="Straight Arrow Connector 59">
             <a:extLst>
               <a:ext uri="{FF2B5EF4-FFF2-40B4-BE49-F238E27FC236}">
-                <a16:creationId xmlns="" xmlns:a16="http://schemas.microsoft.com/office/drawing/2014/main" id="{588DDB9A-AB95-4FA6-8B6B-D0F37161E799}"/>
+                <a16:creationId xmlns:a16="http://schemas.microsoft.com/office/drawing/2014/main" xmlns="" id="{588DDB9A-AB95-4FA6-8B6B-D0F37161E799}"/>
               </a:ext>
             </a:extLst>
           </p:cNvPr>
@@ -5322,7 +5325,7 @@
           <p:cNvPr id="61" name="TextBox 60">
             <a:extLst>
               <a:ext uri="{FF2B5EF4-FFF2-40B4-BE49-F238E27FC236}">
-                <a16:creationId xmlns="" xmlns:a16="http://schemas.microsoft.com/office/drawing/2014/main" id="{20FBF2E3-F78B-437F-A383-84C582914762}"/>
+                <a16:creationId xmlns:a16="http://schemas.microsoft.com/office/drawing/2014/main" xmlns="" id="{20FBF2E3-F78B-437F-A383-84C582914762}"/>
               </a:ext>
             </a:extLst>
           </p:cNvPr>
@@ -5358,7 +5361,7 @@
           <p:cNvPr id="62" name="Straight Arrow Connector 61">
             <a:extLst>
               <a:ext uri="{FF2B5EF4-FFF2-40B4-BE49-F238E27FC236}">
-                <a16:creationId xmlns="" xmlns:a16="http://schemas.microsoft.com/office/drawing/2014/main" id="{588DDB9A-AB95-4FA6-8B6B-D0F37161E799}"/>
+                <a16:creationId xmlns:a16="http://schemas.microsoft.com/office/drawing/2014/main" xmlns="" id="{588DDB9A-AB95-4FA6-8B6B-D0F37161E799}"/>
               </a:ext>
             </a:extLst>
           </p:cNvPr>
@@ -5397,7 +5400,7 @@
           <p:cNvPr id="63" name="TextBox 62">
             <a:extLst>
               <a:ext uri="{FF2B5EF4-FFF2-40B4-BE49-F238E27FC236}">
-                <a16:creationId xmlns="" xmlns:a16="http://schemas.microsoft.com/office/drawing/2014/main" id="{20FBF2E3-F78B-437F-A383-84C582914762}"/>
+                <a16:creationId xmlns:a16="http://schemas.microsoft.com/office/drawing/2014/main" xmlns="" id="{20FBF2E3-F78B-437F-A383-84C582914762}"/>
               </a:ext>
             </a:extLst>
           </p:cNvPr>
@@ -5433,7 +5436,7 @@
           <p:cNvPr id="64" name="Straight Arrow Connector 63">
             <a:extLst>
               <a:ext uri="{FF2B5EF4-FFF2-40B4-BE49-F238E27FC236}">
-                <a16:creationId xmlns="" xmlns:a16="http://schemas.microsoft.com/office/drawing/2014/main" id="{588DDB9A-AB95-4FA6-8B6B-D0F37161E799}"/>
+                <a16:creationId xmlns:a16="http://schemas.microsoft.com/office/drawing/2014/main" xmlns="" id="{588DDB9A-AB95-4FA6-8B6B-D0F37161E799}"/>
               </a:ext>
             </a:extLst>
           </p:cNvPr>
@@ -5472,7 +5475,7 @@
           <p:cNvPr id="65" name="TextBox 64">
             <a:extLst>
               <a:ext uri="{FF2B5EF4-FFF2-40B4-BE49-F238E27FC236}">
-                <a16:creationId xmlns="" xmlns:a16="http://schemas.microsoft.com/office/drawing/2014/main" id="{20FBF2E3-F78B-437F-A383-84C582914762}"/>
+                <a16:creationId xmlns:a16="http://schemas.microsoft.com/office/drawing/2014/main" xmlns="" id="{20FBF2E3-F78B-437F-A383-84C582914762}"/>
               </a:ext>
             </a:extLst>
           </p:cNvPr>
@@ -5508,7 +5511,7 @@
           <p:cNvPr id="66" name="Straight Arrow Connector 65">
             <a:extLst>
               <a:ext uri="{FF2B5EF4-FFF2-40B4-BE49-F238E27FC236}">
-                <a16:creationId xmlns="" xmlns:a16="http://schemas.microsoft.com/office/drawing/2014/main" id="{588DDB9A-AB95-4FA6-8B6B-D0F37161E799}"/>
+                <a16:creationId xmlns:a16="http://schemas.microsoft.com/office/drawing/2014/main" xmlns="" id="{588DDB9A-AB95-4FA6-8B6B-D0F37161E799}"/>
               </a:ext>
             </a:extLst>
           </p:cNvPr>
@@ -5547,7 +5550,7 @@
           <p:cNvPr id="67" name="TextBox 66">
             <a:extLst>
               <a:ext uri="{FF2B5EF4-FFF2-40B4-BE49-F238E27FC236}">
-                <a16:creationId xmlns="" xmlns:a16="http://schemas.microsoft.com/office/drawing/2014/main" id="{20FBF2E3-F78B-437F-A383-84C582914762}"/>
+                <a16:creationId xmlns:a16="http://schemas.microsoft.com/office/drawing/2014/main" xmlns="" id="{20FBF2E3-F78B-437F-A383-84C582914762}"/>
               </a:ext>
             </a:extLst>
           </p:cNvPr>
@@ -5587,7 +5590,7 @@
           <p:cNvPr id="68" name="Straight Arrow Connector 67">
             <a:extLst>
               <a:ext uri="{FF2B5EF4-FFF2-40B4-BE49-F238E27FC236}">
-                <a16:creationId xmlns="" xmlns:a16="http://schemas.microsoft.com/office/drawing/2014/main" id="{588DDB9A-AB95-4FA6-8B6B-D0F37161E799}"/>
+                <a16:creationId xmlns:a16="http://schemas.microsoft.com/office/drawing/2014/main" xmlns="" id="{588DDB9A-AB95-4FA6-8B6B-D0F37161E799}"/>
               </a:ext>
             </a:extLst>
           </p:cNvPr>
@@ -5626,7 +5629,7 @@
           <p:cNvPr id="70" name="Straight Arrow Connector 69">
             <a:extLst>
               <a:ext uri="{FF2B5EF4-FFF2-40B4-BE49-F238E27FC236}">
-                <a16:creationId xmlns="" xmlns:a16="http://schemas.microsoft.com/office/drawing/2014/main" id="{588DDB9A-AB95-4FA6-8B6B-D0F37161E799}"/>
+                <a16:creationId xmlns:a16="http://schemas.microsoft.com/office/drawing/2014/main" xmlns="" id="{588DDB9A-AB95-4FA6-8B6B-D0F37161E799}"/>
               </a:ext>
             </a:extLst>
           </p:cNvPr>
@@ -5665,7 +5668,7 @@
           <p:cNvPr id="71" name="TextBox 70">
             <a:extLst>
               <a:ext uri="{FF2B5EF4-FFF2-40B4-BE49-F238E27FC236}">
-                <a16:creationId xmlns="" xmlns:a16="http://schemas.microsoft.com/office/drawing/2014/main" id="{20FBF2E3-F78B-437F-A383-84C582914762}"/>
+                <a16:creationId xmlns:a16="http://schemas.microsoft.com/office/drawing/2014/main" xmlns="" id="{20FBF2E3-F78B-437F-A383-84C582914762}"/>
               </a:ext>
             </a:extLst>
           </p:cNvPr>
@@ -5701,7 +5704,7 @@
           <p:cNvPr id="73" name="Straight Arrow Connector 72">
             <a:extLst>
               <a:ext uri="{FF2B5EF4-FFF2-40B4-BE49-F238E27FC236}">
-                <a16:creationId xmlns="" xmlns:a16="http://schemas.microsoft.com/office/drawing/2014/main" id="{588DDB9A-AB95-4FA6-8B6B-D0F37161E799}"/>
+                <a16:creationId xmlns:a16="http://schemas.microsoft.com/office/drawing/2014/main" xmlns="" id="{588DDB9A-AB95-4FA6-8B6B-D0F37161E799}"/>
               </a:ext>
             </a:extLst>
           </p:cNvPr>
@@ -5740,7 +5743,7 @@
           <p:cNvPr id="74" name="TextBox 73">
             <a:extLst>
               <a:ext uri="{FF2B5EF4-FFF2-40B4-BE49-F238E27FC236}">
-                <a16:creationId xmlns="" xmlns:a16="http://schemas.microsoft.com/office/drawing/2014/main" id="{20FBF2E3-F78B-437F-A383-84C582914762}"/>
+                <a16:creationId xmlns:a16="http://schemas.microsoft.com/office/drawing/2014/main" xmlns="" id="{20FBF2E3-F78B-437F-A383-84C582914762}"/>
               </a:ext>
             </a:extLst>
           </p:cNvPr>
@@ -5776,7 +5779,7 @@
           <p:cNvPr id="75" name="TextBox 74">
             <a:extLst>
               <a:ext uri="{FF2B5EF4-FFF2-40B4-BE49-F238E27FC236}">
-                <a16:creationId xmlns="" xmlns:a16="http://schemas.microsoft.com/office/drawing/2014/main" id="{20FBF2E3-F78B-437F-A383-84C582914762}"/>
+                <a16:creationId xmlns:a16="http://schemas.microsoft.com/office/drawing/2014/main" xmlns="" id="{20FBF2E3-F78B-437F-A383-84C582914762}"/>
               </a:ext>
             </a:extLst>
           </p:cNvPr>
@@ -5812,7 +5815,7 @@
           <p:cNvPr id="78" name="Straight Arrow Connector 77">
             <a:extLst>
               <a:ext uri="{FF2B5EF4-FFF2-40B4-BE49-F238E27FC236}">
-                <a16:creationId xmlns="" xmlns:a16="http://schemas.microsoft.com/office/drawing/2014/main" id="{588DDB9A-AB95-4FA6-8B6B-D0F37161E799}"/>
+                <a16:creationId xmlns:a16="http://schemas.microsoft.com/office/drawing/2014/main" xmlns="" id="{588DDB9A-AB95-4FA6-8B6B-D0F37161E799}"/>
               </a:ext>
             </a:extLst>
           </p:cNvPr>
@@ -5851,7 +5854,7 @@
           <p:cNvPr id="79" name="TextBox 78">
             <a:extLst>
               <a:ext uri="{FF2B5EF4-FFF2-40B4-BE49-F238E27FC236}">
-                <a16:creationId xmlns="" xmlns:a16="http://schemas.microsoft.com/office/drawing/2014/main" id="{20FBF2E3-F78B-437F-A383-84C582914762}"/>
+                <a16:creationId xmlns:a16="http://schemas.microsoft.com/office/drawing/2014/main" xmlns="" id="{20FBF2E3-F78B-437F-A383-84C582914762}"/>
               </a:ext>
             </a:extLst>
           </p:cNvPr>
@@ -5886,6 +5889,430 @@
     <p:extLst>
       <p:ext uri="{BB962C8B-B14F-4D97-AF65-F5344CB8AC3E}">
         <p14:creationId xmlns:p14="http://schemas.microsoft.com/office/powerpoint/2010/main" val="3248960819"/>
+      </p:ext>
+    </p:extLst>
+  </p:cSld>
+  <p:clrMapOvr>
+    <a:masterClrMapping/>
+  </p:clrMapOvr>
+</p:sld>
+</file>
+
+<file path=ppt/slides/slide3.xml><?xml version="1.0" encoding="utf-8"?>
+<p:sld xmlns:a="http://schemas.openxmlformats.org/drawingml/2006/main" xmlns:r="http://schemas.openxmlformats.org/officeDocument/2006/relationships" xmlns:p="http://schemas.openxmlformats.org/presentationml/2006/main">
+  <p:cSld>
+    <p:spTree>
+      <p:nvGrpSpPr>
+        <p:cNvPr id="1" name=""/>
+        <p:cNvGrpSpPr/>
+        <p:nvPr/>
+      </p:nvGrpSpPr>
+      <p:grpSpPr>
+        <a:xfrm>
+          <a:off x="0" y="0"/>
+          <a:ext cx="0" cy="0"/>
+          <a:chOff x="0" y="0"/>
+          <a:chExt cx="0" cy="0"/>
+        </a:xfrm>
+      </p:grpSpPr>
+      <p:sp>
+        <p:nvSpPr>
+          <p:cNvPr id="2" name="Title 1"/>
+          <p:cNvSpPr>
+            <a:spLocks noGrp="1"/>
+          </p:cNvSpPr>
+          <p:nvPr>
+            <p:ph type="title"/>
+          </p:nvPr>
+        </p:nvSpPr>
+        <p:spPr/>
+        <p:txBody>
+          <a:bodyPr/>
+          <a:lstStyle/>
+          <a:p>
+            <a:r>
+              <a:rPr lang="en-US" dirty="0" smtClean="0"/>
+              <a:t>Link Bar</a:t>
+            </a:r>
+            <a:endParaRPr lang="en-US" dirty="0"/>
+          </a:p>
+        </p:txBody>
+      </p:sp>
+      <p:sp>
+        <p:nvSpPr>
+          <p:cNvPr id="3" name="Content Placeholder 2"/>
+          <p:cNvSpPr>
+            <a:spLocks noGrp="1"/>
+          </p:cNvSpPr>
+          <p:nvPr>
+            <p:ph idx="1"/>
+          </p:nvPr>
+        </p:nvSpPr>
+        <p:spPr/>
+        <p:txBody>
+          <a:bodyPr/>
+          <a:lstStyle/>
+          <a:p>
+            <a:pPr marL="0" indent="0">
+              <a:buNone/>
+            </a:pPr>
+            <a:r>
+              <a:rPr lang="en-US" dirty="0"/>
+              <a:t>[</a:t>
+            </a:r>
+            <a:r>
+              <a:rPr lang="en-US" dirty="0" err="1"/>
+              <a:t>Commands|Notebook</a:t>
+            </a:r>
+            <a:r>
+              <a:rPr lang="en-US" dirty="0"/>
+              <a:t> Commands]|[</a:t>
+            </a:r>
+            <a:r>
+              <a:rPr lang="en-US" dirty="0" err="1"/>
+              <a:t>Buttons|Magic</a:t>
+            </a:r>
+            <a:r>
+              <a:rPr lang="en-US" dirty="0"/>
+              <a:t> Button</a:t>
+            </a:r>
+            <a:r>
+              <a:rPr lang="en-US" dirty="0" smtClean="0"/>
+              <a:t>]</a:t>
+            </a:r>
+          </a:p>
+          <a:p>
+            <a:pPr marL="0" indent="0">
+              <a:buNone/>
+            </a:pPr>
+            <a:endParaRPr lang="en-US" dirty="0"/>
+          </a:p>
+          <a:p>
+            <a:pPr marL="0" indent="0">
+              <a:buNone/>
+            </a:pPr>
+            <a:r>
+              <a:rPr lang="en-US" dirty="0"/>
+              <a:t>displays as </a:t>
+            </a:r>
+          </a:p>
+          <a:p>
+            <a:pPr marL="0" indent="0">
+              <a:buNone/>
+            </a:pPr>
+            <a:endParaRPr lang="en-US" dirty="0"/>
+          </a:p>
+          <a:p>
+            <a:pPr marL="0" indent="0">
+              <a:buNone/>
+            </a:pPr>
+            <a:r>
+              <a:rPr lang="en-US" dirty="0" err="1"/>
+              <a:t>Commands|Buttons</a:t>
+            </a:r>
+            <a:endParaRPr lang="en-US" dirty="0"/>
+          </a:p>
+        </p:txBody>
+      </p:sp>
+    </p:spTree>
+    <p:extLst>
+      <p:ext uri="{BB962C8B-B14F-4D97-AF65-F5344CB8AC3E}">
+        <p14:creationId xmlns:p14="http://schemas.microsoft.com/office/powerpoint/2010/main" val="3851638126"/>
+      </p:ext>
+    </p:extLst>
+  </p:cSld>
+  <p:clrMapOvr>
+    <a:masterClrMapping/>
+  </p:clrMapOvr>
+</p:sld>
+</file>
+
+<file path=ppt/slides/slide4.xml><?xml version="1.0" encoding="utf-8"?>
+<p:sld xmlns:a="http://schemas.openxmlformats.org/drawingml/2006/main" xmlns:r="http://schemas.openxmlformats.org/officeDocument/2006/relationships" xmlns:p="http://schemas.openxmlformats.org/presentationml/2006/main">
+  <p:cSld>
+    <p:spTree>
+      <p:nvGrpSpPr>
+        <p:cNvPr id="1" name=""/>
+        <p:cNvGrpSpPr/>
+        <p:nvPr/>
+      </p:nvGrpSpPr>
+      <p:grpSpPr>
+        <a:xfrm>
+          <a:off x="0" y="0"/>
+          <a:ext cx="0" cy="0"/>
+          <a:chOff x="0" y="0"/>
+          <a:chExt cx="0" cy="0"/>
+        </a:xfrm>
+      </p:grpSpPr>
+      <p:sp>
+        <p:nvSpPr>
+          <p:cNvPr id="2" name="Title 1"/>
+          <p:cNvSpPr>
+            <a:spLocks noGrp="1"/>
+          </p:cNvSpPr>
+          <p:nvPr>
+            <p:ph type="title"/>
+          </p:nvPr>
+        </p:nvSpPr>
+        <p:spPr/>
+        <p:txBody>
+          <a:bodyPr/>
+          <a:lstStyle/>
+          <a:p>
+            <a:r>
+              <a:rPr lang="en-US" dirty="0" smtClean="0"/>
+              <a:t>Text Styles</a:t>
+            </a:r>
+            <a:endParaRPr lang="en-US" dirty="0"/>
+          </a:p>
+        </p:txBody>
+      </p:sp>
+      <p:sp>
+        <p:nvSpPr>
+          <p:cNvPr id="3" name="Content Placeholder 2"/>
+          <p:cNvSpPr>
+            <a:spLocks noGrp="1"/>
+          </p:cNvSpPr>
+          <p:nvPr>
+            <p:ph idx="1"/>
+          </p:nvPr>
+        </p:nvSpPr>
+        <p:spPr/>
+        <p:txBody>
+          <a:bodyPr>
+            <a:normAutofit fontScale="62500" lnSpcReduction="20000"/>
+          </a:bodyPr>
+          <a:lstStyle/>
+          <a:p>
+            <a:r>
+              <a:rPr lang="en-US" dirty="0"/>
+              <a:t>All text styles are available using HTML-like tags. </a:t>
+            </a:r>
+          </a:p>
+          <a:p>
+            <a:r>
+              <a:rPr lang="en-US" dirty="0"/>
+              <a:t>	&lt;h&gt;...&lt;/h&gt;  -- Inline Header </a:t>
+            </a:r>
+          </a:p>
+          <a:p>
+            <a:r>
+              <a:rPr lang="en-US" dirty="0"/>
+              <a:t>	&lt;b&gt;...&lt;/b&gt;  -- Boldface </a:t>
+            </a:r>
+          </a:p>
+          <a:p>
+            <a:r>
+              <a:rPr lang="en-US" dirty="0"/>
+              <a:t>	&lt;</a:t>
+            </a:r>
+            <a:r>
+              <a:rPr lang="en-US" dirty="0" err="1"/>
+              <a:t>i</a:t>
+            </a:r>
+            <a:r>
+              <a:rPr lang="en-US" dirty="0"/>
+              <a:t>&gt;...&lt;/</a:t>
+            </a:r>
+            <a:r>
+              <a:rPr lang="en-US" dirty="0" err="1"/>
+              <a:t>i</a:t>
+            </a:r>
+            <a:r>
+              <a:rPr lang="en-US" dirty="0"/>
+              <a:t>&gt;  -- Italics </a:t>
+            </a:r>
+          </a:p>
+          <a:p>
+            <a:r>
+              <a:rPr lang="en-US" dirty="0"/>
+              <a:t>	&lt;m&gt;...&lt;/m&gt;  -- Monospace </a:t>
+            </a:r>
+          </a:p>
+          <a:p>
+            <a:r>
+              <a:rPr lang="en-US" dirty="0"/>
+              <a:t>	&lt;s&gt;...&lt;/s&gt;  -- Small Type </a:t>
+            </a:r>
+          </a:p>
+          <a:p>
+            <a:r>
+              <a:rPr lang="en-US" dirty="0"/>
+              <a:t>	&lt;x&gt;...&lt;/x&gt;  -- Strikeout </a:t>
+            </a:r>
+            <a:endParaRPr lang="en-US" dirty="0" smtClean="0"/>
+          </a:p>
+          <a:p>
+            <a:endParaRPr lang="en-US" dirty="0"/>
+          </a:p>
+          <a:p>
+            <a:r>
+              <a:rPr lang="en-US" dirty="0"/>
+              <a:t>Bold and italics can also be entered using traditional Wiki-like markup: </a:t>
+            </a:r>
+          </a:p>
+          <a:p>
+            <a:endParaRPr lang="en-US" dirty="0"/>
+          </a:p>
+          <a:p>
+            <a:r>
+              <a:rPr lang="en-US" dirty="0"/>
+              <a:t>'''Bold''', ''Italic'', '''''Bold and Italic'''''</a:t>
+            </a:r>
+          </a:p>
+          <a:p>
+            <a:endParaRPr lang="en-US" dirty="0"/>
+          </a:p>
+          <a:p>
+            <a:r>
+              <a:rPr lang="en-US" dirty="0"/>
+              <a:t>Bold, Italic, Bold and Italic </a:t>
+            </a:r>
+          </a:p>
+        </p:txBody>
+      </p:sp>
+    </p:spTree>
+    <p:extLst>
+      <p:ext uri="{BB962C8B-B14F-4D97-AF65-F5344CB8AC3E}">
+        <p14:creationId xmlns:p14="http://schemas.microsoft.com/office/powerpoint/2010/main" val="2804417178"/>
+      </p:ext>
+    </p:extLst>
+  </p:cSld>
+  <p:clrMapOvr>
+    <a:masterClrMapping/>
+  </p:clrMapOvr>
+</p:sld>
+</file>
+
+<file path=ppt/slides/slide5.xml><?xml version="1.0" encoding="utf-8"?>
+<p:sld xmlns:a="http://schemas.openxmlformats.org/drawingml/2006/main" xmlns:r="http://schemas.openxmlformats.org/officeDocument/2006/relationships" xmlns:p="http://schemas.openxmlformats.org/presentationml/2006/main">
+  <p:cSld>
+    <p:spTree>
+      <p:nvGrpSpPr>
+        <p:cNvPr id="1" name=""/>
+        <p:cNvGrpSpPr/>
+        <p:nvPr/>
+      </p:nvGrpSpPr>
+      <p:grpSpPr>
+        <a:xfrm>
+          <a:off x="0" y="0"/>
+          <a:ext cx="0" cy="0"/>
+          <a:chOff x="0" y="0"/>
+          <a:chExt cx="0" cy="0"/>
+        </a:xfrm>
+      </p:grpSpPr>
+      <p:sp>
+        <p:nvSpPr>
+          <p:cNvPr id="2" name="Title 1"/>
+          <p:cNvSpPr>
+            <a:spLocks noGrp="1"/>
+          </p:cNvSpPr>
+          <p:nvPr>
+            <p:ph type="title"/>
+          </p:nvPr>
+        </p:nvSpPr>
+        <p:spPr/>
+        <p:txBody>
+          <a:bodyPr/>
+          <a:lstStyle/>
+          <a:p>
+            <a:r>
+              <a:rPr lang="en-US" dirty="0" smtClean="0"/>
+              <a:t>Section Headers</a:t>
+            </a:r>
+            <a:endParaRPr lang="en-US" dirty="0"/>
+          </a:p>
+        </p:txBody>
+      </p:sp>
+      <p:sp>
+        <p:nvSpPr>
+          <p:cNvPr id="3" name="Content Placeholder 2"/>
+          <p:cNvSpPr>
+            <a:spLocks noGrp="1"/>
+          </p:cNvSpPr>
+          <p:nvPr>
+            <p:ph idx="1"/>
+          </p:nvPr>
+        </p:nvSpPr>
+        <p:spPr/>
+        <p:txBody>
+          <a:bodyPr>
+            <a:normAutofit fontScale="62500" lnSpcReduction="20000"/>
+          </a:bodyPr>
+          <a:lstStyle/>
+          <a:p>
+            <a:r>
+              <a:rPr lang="en-US" dirty="0"/>
+              <a:t>The markup for these three kinds of header looks like this: </a:t>
+            </a:r>
+          </a:p>
+          <a:p>
+            <a:endParaRPr lang="en-US" dirty="0"/>
+          </a:p>
+          <a:p>
+            <a:r>
+              <a:rPr lang="en-US" dirty="0"/>
+              <a:t>= A Level 1 Header =</a:t>
+            </a:r>
+          </a:p>
+          <a:p>
+            <a:endParaRPr lang="en-US" smtClean="0"/>
+          </a:p>
+          <a:p>
+            <a:r>
+              <a:rPr lang="en-US" smtClean="0"/>
+              <a:t>== </a:t>
+            </a:r>
+            <a:r>
+              <a:rPr lang="en-US" dirty="0"/>
+              <a:t>A Level 2 Header ==</a:t>
+            </a:r>
+          </a:p>
+          <a:p>
+            <a:endParaRPr lang="en-US" dirty="0"/>
+          </a:p>
+          <a:p>
+            <a:r>
+              <a:rPr lang="en-US" dirty="0"/>
+              <a:t>=== A Level 3 Header ===</a:t>
+            </a:r>
+          </a:p>
+          <a:p>
+            <a:endParaRPr lang="en-US" dirty="0"/>
+          </a:p>
+          <a:p>
+            <a:r>
+              <a:rPr lang="en-US" dirty="0"/>
+              <a:t>There are some important rules: </a:t>
+            </a:r>
+          </a:p>
+          <a:p>
+            <a:endParaRPr lang="en-US" dirty="0"/>
+          </a:p>
+          <a:p>
+            <a:r>
+              <a:rPr lang="en-US" dirty="0"/>
+              <a:t>	The "=" must be the first character on the line. </a:t>
+            </a:r>
+          </a:p>
+          <a:p>
+            <a:r>
+              <a:rPr lang="en-US" dirty="0"/>
+              <a:t>	There must be no text (not even whitespace) following the final "=" on the line. </a:t>
+            </a:r>
+          </a:p>
+          <a:p>
+            <a:r>
+              <a:rPr lang="en-US" dirty="0"/>
+              <a:t>	There must be at least one space character between the "=" characters and the actual text of the header. </a:t>
+            </a:r>
+          </a:p>
+        </p:txBody>
+      </p:sp>
+    </p:spTree>
+    <p:extLst>
+      <p:ext uri="{BB962C8B-B14F-4D97-AF65-F5344CB8AC3E}">
+        <p14:creationId xmlns:p14="http://schemas.microsoft.com/office/powerpoint/2010/main" val="3014659890"/>
       </p:ext>
     </p:extLst>
   </p:cSld>

</xml_diff>

<commit_message>
Solve hand cursor in edit mode issue; solve edit mode not always base font issue
</commit_message>
<xml_diff>
--- a/record.pptx
+++ b/record.pptx
@@ -10,6 +10,7 @@
     <p:sldId id="259" r:id="rId4"/>
     <p:sldId id="260" r:id="rId5"/>
     <p:sldId id="261" r:id="rId6"/>
+    <p:sldId id="262" r:id="rId7"/>
   </p:sldIdLst>
   <p:sldSz cx="12192000" cy="6858000"/>
   <p:notesSz cx="6858000" cy="9144000"/>
@@ -127,10 +128,6 @@
 </p:presentation>
 </file>
 
-<file path=ppt/revisionInfo.xml><?xml version="1.0" encoding="utf-8"?>
-<p1510:revInfo xmlns:a="http://schemas.openxmlformats.org/drawingml/2006/main" xmlns:r="http://schemas.openxmlformats.org/officeDocument/2006/relationships" xmlns:p1510="http://schemas.microsoft.com/office/powerpoint/2015/10/main"/>
-</file>
-
 <file path=ppt/slideLayouts/slideLayout1.xml><?xml version="1.0" encoding="utf-8"?>
 <p:sldLayout xmlns:a="http://schemas.openxmlformats.org/drawingml/2006/main" xmlns:r="http://schemas.openxmlformats.org/officeDocument/2006/relationships" xmlns:p="http://schemas.openxmlformats.org/presentationml/2006/main" type="title" preserve="1">
   <p:cSld name="Title Slide">
@@ -260,7 +257,7 @@
           <a:p>
             <a:fld id="{BD371D8B-6EEF-4666-9EDE-D125F1A89B84}" type="datetimeFigureOut">
               <a:rPr lang="en-US" smtClean="0"/>
-              <a:t>11/10/2017</a:t>
+              <a:t>1/17/2019</a:t>
             </a:fld>
             <a:endParaRPr lang="en-US"/>
           </a:p>
@@ -428,7 +425,7 @@
           <a:p>
             <a:fld id="{BD371D8B-6EEF-4666-9EDE-D125F1A89B84}" type="datetimeFigureOut">
               <a:rPr lang="en-US" smtClean="0"/>
-              <a:t>11/10/2017</a:t>
+              <a:t>1/17/2019</a:t>
             </a:fld>
             <a:endParaRPr lang="en-US"/>
           </a:p>
@@ -606,7 +603,7 @@
           <a:p>
             <a:fld id="{BD371D8B-6EEF-4666-9EDE-D125F1A89B84}" type="datetimeFigureOut">
               <a:rPr lang="en-US" smtClean="0"/>
-              <a:t>11/10/2017</a:t>
+              <a:t>1/17/2019</a:t>
             </a:fld>
             <a:endParaRPr lang="en-US"/>
           </a:p>
@@ -774,7 +771,7 @@
           <a:p>
             <a:fld id="{BD371D8B-6EEF-4666-9EDE-D125F1A89B84}" type="datetimeFigureOut">
               <a:rPr lang="en-US" smtClean="0"/>
-              <a:t>11/10/2017</a:t>
+              <a:t>1/17/2019</a:t>
             </a:fld>
             <a:endParaRPr lang="en-US"/>
           </a:p>
@@ -1019,7 +1016,7 @@
           <a:p>
             <a:fld id="{BD371D8B-6EEF-4666-9EDE-D125F1A89B84}" type="datetimeFigureOut">
               <a:rPr lang="en-US" smtClean="0"/>
-              <a:t>11/10/2017</a:t>
+              <a:t>1/17/2019</a:t>
             </a:fld>
             <a:endParaRPr lang="en-US"/>
           </a:p>
@@ -1248,7 +1245,7 @@
           <a:p>
             <a:fld id="{BD371D8B-6EEF-4666-9EDE-D125F1A89B84}" type="datetimeFigureOut">
               <a:rPr lang="en-US" smtClean="0"/>
-              <a:t>11/10/2017</a:t>
+              <a:t>1/17/2019</a:t>
             </a:fld>
             <a:endParaRPr lang="en-US"/>
           </a:p>
@@ -1612,7 +1609,7 @@
           <a:p>
             <a:fld id="{BD371D8B-6EEF-4666-9EDE-D125F1A89B84}" type="datetimeFigureOut">
               <a:rPr lang="en-US" smtClean="0"/>
-              <a:t>11/10/2017</a:t>
+              <a:t>1/17/2019</a:t>
             </a:fld>
             <a:endParaRPr lang="en-US"/>
           </a:p>
@@ -1729,7 +1726,7 @@
           <a:p>
             <a:fld id="{BD371D8B-6EEF-4666-9EDE-D125F1A89B84}" type="datetimeFigureOut">
               <a:rPr lang="en-US" smtClean="0"/>
-              <a:t>11/10/2017</a:t>
+              <a:t>1/17/2019</a:t>
             </a:fld>
             <a:endParaRPr lang="en-US"/>
           </a:p>
@@ -1824,7 +1821,7 @@
           <a:p>
             <a:fld id="{BD371D8B-6EEF-4666-9EDE-D125F1A89B84}" type="datetimeFigureOut">
               <a:rPr lang="en-US" smtClean="0"/>
-              <a:t>11/10/2017</a:t>
+              <a:t>1/17/2019</a:t>
             </a:fld>
             <a:endParaRPr lang="en-US"/>
           </a:p>
@@ -2099,7 +2096,7 @@
           <a:p>
             <a:fld id="{BD371D8B-6EEF-4666-9EDE-D125F1A89B84}" type="datetimeFigureOut">
               <a:rPr lang="en-US" smtClean="0"/>
-              <a:t>11/10/2017</a:t>
+              <a:t>1/17/2019</a:t>
             </a:fld>
             <a:endParaRPr lang="en-US"/>
           </a:p>
@@ -2351,7 +2348,7 @@
           <a:p>
             <a:fld id="{BD371D8B-6EEF-4666-9EDE-D125F1A89B84}" type="datetimeFigureOut">
               <a:rPr lang="en-US" smtClean="0"/>
-              <a:t>11/10/2017</a:t>
+              <a:t>1/17/2019</a:t>
             </a:fld>
             <a:endParaRPr lang="en-US"/>
           </a:p>
@@ -2562,7 +2559,7 @@
           <a:p>
             <a:fld id="{BD371D8B-6EEF-4666-9EDE-D125F1A89B84}" type="datetimeFigureOut">
               <a:rPr lang="en-US" smtClean="0"/>
-              <a:t>11/10/2017</a:t>
+              <a:t>1/17/2019</a:t>
             </a:fld>
             <a:endParaRPr lang="en-US"/>
           </a:p>
@@ -3406,7 +3403,7 @@
           <p:cNvPr id="2" name="Title 1">
             <a:extLst>
               <a:ext uri="{FF2B5EF4-FFF2-40B4-BE49-F238E27FC236}">
-                <a16:creationId xmlns:a16="http://schemas.microsoft.com/office/drawing/2014/main" xmlns="" id="{057A1603-A347-44E4-9FE3-0880CBA392DF}"/>
+                <a16:creationId xmlns:a16="http://schemas.microsoft.com/office/drawing/2014/main" id="{057A1603-A347-44E4-9FE3-0880CBA392DF}"/>
               </a:ext>
             </a:extLst>
           </p:cNvPr>
@@ -3439,7 +3436,7 @@
           <p:cNvPr id="5" name="TextBox 4">
             <a:extLst>
               <a:ext uri="{FF2B5EF4-FFF2-40B4-BE49-F238E27FC236}">
-                <a16:creationId xmlns:a16="http://schemas.microsoft.com/office/drawing/2014/main" xmlns="" id="{A0F9B324-8F3E-403A-9AC4-F7308ED423B5}"/>
+                <a16:creationId xmlns:a16="http://schemas.microsoft.com/office/drawing/2014/main" id="{A0F9B324-8F3E-403A-9AC4-F7308ED423B5}"/>
               </a:ext>
             </a:extLst>
           </p:cNvPr>
@@ -3475,7 +3472,7 @@
           <p:cNvPr id="6" name="TextBox 5">
             <a:extLst>
               <a:ext uri="{FF2B5EF4-FFF2-40B4-BE49-F238E27FC236}">
-                <a16:creationId xmlns:a16="http://schemas.microsoft.com/office/drawing/2014/main" xmlns="" id="{6542935A-8021-4B2F-B427-B65304AECF70}"/>
+                <a16:creationId xmlns:a16="http://schemas.microsoft.com/office/drawing/2014/main" id="{6542935A-8021-4B2F-B427-B65304AECF70}"/>
               </a:ext>
             </a:extLst>
           </p:cNvPr>
@@ -3511,7 +3508,7 @@
           <p:cNvPr id="8" name="Straight Arrow Connector 7">
             <a:extLst>
               <a:ext uri="{FF2B5EF4-FFF2-40B4-BE49-F238E27FC236}">
-                <a16:creationId xmlns:a16="http://schemas.microsoft.com/office/drawing/2014/main" xmlns="" id="{588DDB9A-AB95-4FA6-8B6B-D0F37161E799}"/>
+                <a16:creationId xmlns:a16="http://schemas.microsoft.com/office/drawing/2014/main" id="{588DDB9A-AB95-4FA6-8B6B-D0F37161E799}"/>
               </a:ext>
             </a:extLst>
           </p:cNvPr>
@@ -3550,7 +3547,7 @@
           <p:cNvPr id="9" name="Straight Arrow Connector 8">
             <a:extLst>
               <a:ext uri="{FF2B5EF4-FFF2-40B4-BE49-F238E27FC236}">
-                <a16:creationId xmlns:a16="http://schemas.microsoft.com/office/drawing/2014/main" xmlns="" id="{8BD7C6A1-E004-4EF2-ACEA-6E23EBA31929}"/>
+                <a16:creationId xmlns:a16="http://schemas.microsoft.com/office/drawing/2014/main" id="{8BD7C6A1-E004-4EF2-ACEA-6E23EBA31929}"/>
               </a:ext>
             </a:extLst>
           </p:cNvPr>
@@ -3591,7 +3588,7 @@
           <p:cNvPr id="13" name="Straight Arrow Connector 12">
             <a:extLst>
               <a:ext uri="{FF2B5EF4-FFF2-40B4-BE49-F238E27FC236}">
-                <a16:creationId xmlns:a16="http://schemas.microsoft.com/office/drawing/2014/main" xmlns="" id="{F711FFF0-01CE-4D8B-BF49-78842A10A5CD}"/>
+                <a16:creationId xmlns:a16="http://schemas.microsoft.com/office/drawing/2014/main" id="{F711FFF0-01CE-4D8B-BF49-78842A10A5CD}"/>
               </a:ext>
             </a:extLst>
           </p:cNvPr>
@@ -3630,7 +3627,7 @@
           <p:cNvPr id="15" name="TextBox 14">
             <a:extLst>
               <a:ext uri="{FF2B5EF4-FFF2-40B4-BE49-F238E27FC236}">
-                <a16:creationId xmlns:a16="http://schemas.microsoft.com/office/drawing/2014/main" xmlns="" id="{20FBF2E3-F78B-437F-A383-84C582914762}"/>
+                <a16:creationId xmlns:a16="http://schemas.microsoft.com/office/drawing/2014/main" id="{20FBF2E3-F78B-437F-A383-84C582914762}"/>
               </a:ext>
             </a:extLst>
           </p:cNvPr>
@@ -3665,7 +3662,7 @@
           <p:cNvPr id="16" name="Straight Arrow Connector 15">
             <a:extLst>
               <a:ext uri="{FF2B5EF4-FFF2-40B4-BE49-F238E27FC236}">
-                <a16:creationId xmlns:a16="http://schemas.microsoft.com/office/drawing/2014/main" xmlns="" id="{D9A37250-405D-4730-A685-5EFAD89FE27F}"/>
+                <a16:creationId xmlns:a16="http://schemas.microsoft.com/office/drawing/2014/main" id="{D9A37250-405D-4730-A685-5EFAD89FE27F}"/>
               </a:ext>
             </a:extLst>
           </p:cNvPr>
@@ -3704,7 +3701,7 @@
           <p:cNvPr id="17" name="TextBox 16">
             <a:extLst>
               <a:ext uri="{FF2B5EF4-FFF2-40B4-BE49-F238E27FC236}">
-                <a16:creationId xmlns:a16="http://schemas.microsoft.com/office/drawing/2014/main" xmlns="" id="{FE27B8C7-B2C6-49F3-97BC-B84445243323}"/>
+                <a16:creationId xmlns:a16="http://schemas.microsoft.com/office/drawing/2014/main" id="{FE27B8C7-B2C6-49F3-97BC-B84445243323}"/>
               </a:ext>
             </a:extLst>
           </p:cNvPr>
@@ -3740,7 +3737,7 @@
           <p:cNvPr id="18" name="TextBox 17">
             <a:extLst>
               <a:ext uri="{FF2B5EF4-FFF2-40B4-BE49-F238E27FC236}">
-                <a16:creationId xmlns:a16="http://schemas.microsoft.com/office/drawing/2014/main" xmlns="" id="{49D66CEC-0D8C-4A37-8DE0-258FD857FEBB}"/>
+                <a16:creationId xmlns:a16="http://schemas.microsoft.com/office/drawing/2014/main" id="{49D66CEC-0D8C-4A37-8DE0-258FD857FEBB}"/>
               </a:ext>
             </a:extLst>
           </p:cNvPr>
@@ -3775,7 +3772,7 @@
           <p:cNvPr id="19" name="TextBox 18">
             <a:extLst>
               <a:ext uri="{FF2B5EF4-FFF2-40B4-BE49-F238E27FC236}">
-                <a16:creationId xmlns:a16="http://schemas.microsoft.com/office/drawing/2014/main" xmlns="" id="{60D3B66F-4276-4B29-8E0F-EF00C7C3D2C4}"/>
+                <a16:creationId xmlns:a16="http://schemas.microsoft.com/office/drawing/2014/main" id="{60D3B66F-4276-4B29-8E0F-EF00C7C3D2C4}"/>
               </a:ext>
             </a:extLst>
           </p:cNvPr>
@@ -3810,7 +3807,7 @@
           <p:cNvPr id="20" name="Straight Arrow Connector 19">
             <a:extLst>
               <a:ext uri="{FF2B5EF4-FFF2-40B4-BE49-F238E27FC236}">
-                <a16:creationId xmlns:a16="http://schemas.microsoft.com/office/drawing/2014/main" xmlns="" id="{D2EE6BF4-3DBA-420C-824E-60B1F06199DC}"/>
+                <a16:creationId xmlns:a16="http://schemas.microsoft.com/office/drawing/2014/main" id="{D2EE6BF4-3DBA-420C-824E-60B1F06199DC}"/>
               </a:ext>
             </a:extLst>
           </p:cNvPr>
@@ -3849,7 +3846,7 @@
           <p:cNvPr id="21" name="Straight Arrow Connector 20">
             <a:extLst>
               <a:ext uri="{FF2B5EF4-FFF2-40B4-BE49-F238E27FC236}">
-                <a16:creationId xmlns:a16="http://schemas.microsoft.com/office/drawing/2014/main" xmlns="" id="{28D3130E-3168-46F9-94FF-B187D9E6F7EF}"/>
+                <a16:creationId xmlns:a16="http://schemas.microsoft.com/office/drawing/2014/main" id="{28D3130E-3168-46F9-94FF-B187D9E6F7EF}"/>
               </a:ext>
             </a:extLst>
           </p:cNvPr>
@@ -3888,7 +3885,7 @@
           <p:cNvPr id="22" name="Straight Arrow Connector 21">
             <a:extLst>
               <a:ext uri="{FF2B5EF4-FFF2-40B4-BE49-F238E27FC236}">
-                <a16:creationId xmlns:a16="http://schemas.microsoft.com/office/drawing/2014/main" xmlns="" id="{A00E8B28-5D28-4E20-9DF8-C59A86642C42}"/>
+                <a16:creationId xmlns:a16="http://schemas.microsoft.com/office/drawing/2014/main" id="{A00E8B28-5D28-4E20-9DF8-C59A86642C42}"/>
               </a:ext>
             </a:extLst>
           </p:cNvPr>
@@ -3927,7 +3924,7 @@
           <p:cNvPr id="23" name="Straight Arrow Connector 22">
             <a:extLst>
               <a:ext uri="{FF2B5EF4-FFF2-40B4-BE49-F238E27FC236}">
-                <a16:creationId xmlns:a16="http://schemas.microsoft.com/office/drawing/2014/main" xmlns="" id="{588DDB9A-AB95-4FA6-8B6B-D0F37161E799}"/>
+                <a16:creationId xmlns:a16="http://schemas.microsoft.com/office/drawing/2014/main" id="{588DDB9A-AB95-4FA6-8B6B-D0F37161E799}"/>
               </a:ext>
             </a:extLst>
           </p:cNvPr>
@@ -3966,7 +3963,7 @@
           <p:cNvPr id="24" name="Straight Arrow Connector 23">
             <a:extLst>
               <a:ext uri="{FF2B5EF4-FFF2-40B4-BE49-F238E27FC236}">
-                <a16:creationId xmlns:a16="http://schemas.microsoft.com/office/drawing/2014/main" xmlns="" id="{588DDB9A-AB95-4FA6-8B6B-D0F37161E799}"/>
+                <a16:creationId xmlns:a16="http://schemas.microsoft.com/office/drawing/2014/main" id="{588DDB9A-AB95-4FA6-8B6B-D0F37161E799}"/>
               </a:ext>
             </a:extLst>
           </p:cNvPr>
@@ -4005,7 +4002,7 @@
           <p:cNvPr id="25" name="TextBox 24">
             <a:extLst>
               <a:ext uri="{FF2B5EF4-FFF2-40B4-BE49-F238E27FC236}">
-                <a16:creationId xmlns:a16="http://schemas.microsoft.com/office/drawing/2014/main" xmlns="" id="{60D3B66F-4276-4B29-8E0F-EF00C7C3D2C4}"/>
+                <a16:creationId xmlns:a16="http://schemas.microsoft.com/office/drawing/2014/main" id="{60D3B66F-4276-4B29-8E0F-EF00C7C3D2C4}"/>
               </a:ext>
             </a:extLst>
           </p:cNvPr>
@@ -4029,10 +4026,9 @@
           <a:lstStyle/>
           <a:p>
             <a:r>
-              <a:rPr lang="en-US" dirty="0" smtClean="0"/>
+              <a:rPr lang="en-US" dirty="0"/>
               <a:t>Display Message</a:t>
             </a:r>
-            <a:endParaRPr lang="en-US" dirty="0"/>
           </a:p>
         </p:txBody>
       </p:sp>
@@ -4041,7 +4037,7 @@
           <p:cNvPr id="26" name="Straight Arrow Connector 25">
             <a:extLst>
               <a:ext uri="{FF2B5EF4-FFF2-40B4-BE49-F238E27FC236}">
-                <a16:creationId xmlns:a16="http://schemas.microsoft.com/office/drawing/2014/main" xmlns="" id="{588DDB9A-AB95-4FA6-8B6B-D0F37161E799}"/>
+                <a16:creationId xmlns:a16="http://schemas.microsoft.com/office/drawing/2014/main" id="{588DDB9A-AB95-4FA6-8B6B-D0F37161E799}"/>
               </a:ext>
             </a:extLst>
           </p:cNvPr>
@@ -4080,7 +4076,7 @@
           <p:cNvPr id="27" name="Straight Arrow Connector 26">
             <a:extLst>
               <a:ext uri="{FF2B5EF4-FFF2-40B4-BE49-F238E27FC236}">
-                <a16:creationId xmlns:a16="http://schemas.microsoft.com/office/drawing/2014/main" xmlns="" id="{588DDB9A-AB95-4FA6-8B6B-D0F37161E799}"/>
+                <a16:creationId xmlns:a16="http://schemas.microsoft.com/office/drawing/2014/main" id="{588DDB9A-AB95-4FA6-8B6B-D0F37161E799}"/>
               </a:ext>
             </a:extLst>
           </p:cNvPr>
@@ -4119,7 +4115,7 @@
           <p:cNvPr id="28" name="TextBox 27">
             <a:extLst>
               <a:ext uri="{FF2B5EF4-FFF2-40B4-BE49-F238E27FC236}">
-                <a16:creationId xmlns:a16="http://schemas.microsoft.com/office/drawing/2014/main" xmlns="" id="{20FBF2E3-F78B-437F-A383-84C582914762}"/>
+                <a16:creationId xmlns:a16="http://schemas.microsoft.com/office/drawing/2014/main" id="{20FBF2E3-F78B-437F-A383-84C582914762}"/>
               </a:ext>
             </a:extLst>
           </p:cNvPr>
@@ -4143,10 +4139,9 @@
           <a:lstStyle/>
           <a:p>
             <a:r>
-              <a:rPr lang="en-US" sz="1600" dirty="0" smtClean="0"/>
+              <a:rPr lang="en-US" sz="1600" dirty="0"/>
               <a:t>File</a:t>
             </a:r>
-            <a:endParaRPr lang="en-US" sz="1600" dirty="0"/>
           </a:p>
         </p:txBody>
       </p:sp>
@@ -4155,7 +4150,7 @@
           <p:cNvPr id="29" name="Straight Arrow Connector 28">
             <a:extLst>
               <a:ext uri="{FF2B5EF4-FFF2-40B4-BE49-F238E27FC236}">
-                <a16:creationId xmlns:a16="http://schemas.microsoft.com/office/drawing/2014/main" xmlns="" id="{588DDB9A-AB95-4FA6-8B6B-D0F37161E799}"/>
+                <a16:creationId xmlns:a16="http://schemas.microsoft.com/office/drawing/2014/main" id="{588DDB9A-AB95-4FA6-8B6B-D0F37161E799}"/>
               </a:ext>
             </a:extLst>
           </p:cNvPr>
@@ -4194,7 +4189,7 @@
           <p:cNvPr id="30" name="Straight Arrow Connector 29">
             <a:extLst>
               <a:ext uri="{FF2B5EF4-FFF2-40B4-BE49-F238E27FC236}">
-                <a16:creationId xmlns:a16="http://schemas.microsoft.com/office/drawing/2014/main" xmlns="" id="{588DDB9A-AB95-4FA6-8B6B-D0F37161E799}"/>
+                <a16:creationId xmlns:a16="http://schemas.microsoft.com/office/drawing/2014/main" id="{588DDB9A-AB95-4FA6-8B6B-D0F37161E799}"/>
               </a:ext>
             </a:extLst>
           </p:cNvPr>
@@ -4233,7 +4228,7 @@
           <p:cNvPr id="31" name="TextBox 30">
             <a:extLst>
               <a:ext uri="{FF2B5EF4-FFF2-40B4-BE49-F238E27FC236}">
-                <a16:creationId xmlns:a16="http://schemas.microsoft.com/office/drawing/2014/main" xmlns="" id="{20FBF2E3-F78B-437F-A383-84C582914762}"/>
+                <a16:creationId xmlns:a16="http://schemas.microsoft.com/office/drawing/2014/main" id="{20FBF2E3-F78B-437F-A383-84C582914762}"/>
               </a:ext>
             </a:extLst>
           </p:cNvPr>
@@ -4257,10 +4252,9 @@
           <a:lstStyle/>
           <a:p>
             <a:r>
-              <a:rPr lang="en-US" sz="1400" dirty="0" smtClean="0"/>
+              <a:rPr lang="en-US" sz="1400" dirty="0"/>
               <a:t>New</a:t>
             </a:r>
-            <a:endParaRPr lang="en-US" sz="1400" dirty="0"/>
           </a:p>
         </p:txBody>
       </p:sp>
@@ -4269,7 +4263,7 @@
           <p:cNvPr id="33" name="Straight Arrow Connector 32">
             <a:extLst>
               <a:ext uri="{FF2B5EF4-FFF2-40B4-BE49-F238E27FC236}">
-                <a16:creationId xmlns:a16="http://schemas.microsoft.com/office/drawing/2014/main" xmlns="" id="{588DDB9A-AB95-4FA6-8B6B-D0F37161E799}"/>
+                <a16:creationId xmlns:a16="http://schemas.microsoft.com/office/drawing/2014/main" id="{588DDB9A-AB95-4FA6-8B6B-D0F37161E799}"/>
               </a:ext>
             </a:extLst>
           </p:cNvPr>
@@ -4308,7 +4302,7 @@
           <p:cNvPr id="34" name="TextBox 33">
             <a:extLst>
               <a:ext uri="{FF2B5EF4-FFF2-40B4-BE49-F238E27FC236}">
-                <a16:creationId xmlns:a16="http://schemas.microsoft.com/office/drawing/2014/main" xmlns="" id="{20FBF2E3-F78B-437F-A383-84C582914762}"/>
+                <a16:creationId xmlns:a16="http://schemas.microsoft.com/office/drawing/2014/main" id="{20FBF2E3-F78B-437F-A383-84C582914762}"/>
               </a:ext>
             </a:extLst>
           </p:cNvPr>
@@ -4332,10 +4326,9 @@
           <a:lstStyle/>
           <a:p>
             <a:r>
-              <a:rPr lang="en-US" sz="1400" dirty="0" smtClean="0"/>
+              <a:rPr lang="en-US" sz="1400" dirty="0"/>
               <a:t>Load</a:t>
             </a:r>
-            <a:endParaRPr lang="en-US" sz="1400" dirty="0"/>
           </a:p>
         </p:txBody>
       </p:sp>
@@ -4344,7 +4337,7 @@
           <p:cNvPr id="35" name="Straight Arrow Connector 34">
             <a:extLst>
               <a:ext uri="{FF2B5EF4-FFF2-40B4-BE49-F238E27FC236}">
-                <a16:creationId xmlns:a16="http://schemas.microsoft.com/office/drawing/2014/main" xmlns="" id="{588DDB9A-AB95-4FA6-8B6B-D0F37161E799}"/>
+                <a16:creationId xmlns:a16="http://schemas.microsoft.com/office/drawing/2014/main" id="{588DDB9A-AB95-4FA6-8B6B-D0F37161E799}"/>
               </a:ext>
             </a:extLst>
           </p:cNvPr>
@@ -4383,7 +4376,7 @@
           <p:cNvPr id="36" name="TextBox 35">
             <a:extLst>
               <a:ext uri="{FF2B5EF4-FFF2-40B4-BE49-F238E27FC236}">
-                <a16:creationId xmlns:a16="http://schemas.microsoft.com/office/drawing/2014/main" xmlns="" id="{20FBF2E3-F78B-437F-A383-84C582914762}"/>
+                <a16:creationId xmlns:a16="http://schemas.microsoft.com/office/drawing/2014/main" id="{20FBF2E3-F78B-437F-A383-84C582914762}"/>
               </a:ext>
             </a:extLst>
           </p:cNvPr>
@@ -4407,10 +4400,9 @@
           <a:lstStyle/>
           <a:p>
             <a:r>
-              <a:rPr lang="en-US" sz="1400" dirty="0" smtClean="0"/>
+              <a:rPr lang="en-US" sz="1400" dirty="0"/>
               <a:t>Save</a:t>
             </a:r>
-            <a:endParaRPr lang="en-US" sz="1400" dirty="0"/>
           </a:p>
         </p:txBody>
       </p:sp>
@@ -4419,7 +4411,7 @@
           <p:cNvPr id="37" name="Straight Arrow Connector 36">
             <a:extLst>
               <a:ext uri="{FF2B5EF4-FFF2-40B4-BE49-F238E27FC236}">
-                <a16:creationId xmlns:a16="http://schemas.microsoft.com/office/drawing/2014/main" xmlns="" id="{588DDB9A-AB95-4FA6-8B6B-D0F37161E799}"/>
+                <a16:creationId xmlns:a16="http://schemas.microsoft.com/office/drawing/2014/main" id="{588DDB9A-AB95-4FA6-8B6B-D0F37161E799}"/>
               </a:ext>
             </a:extLst>
           </p:cNvPr>
@@ -4458,7 +4450,7 @@
           <p:cNvPr id="38" name="TextBox 37">
             <a:extLst>
               <a:ext uri="{FF2B5EF4-FFF2-40B4-BE49-F238E27FC236}">
-                <a16:creationId xmlns:a16="http://schemas.microsoft.com/office/drawing/2014/main" xmlns="" id="{20FBF2E3-F78B-437F-A383-84C582914762}"/>
+                <a16:creationId xmlns:a16="http://schemas.microsoft.com/office/drawing/2014/main" id="{20FBF2E3-F78B-437F-A383-84C582914762}"/>
               </a:ext>
             </a:extLst>
           </p:cNvPr>
@@ -4482,10 +4474,9 @@
           <a:lstStyle/>
           <a:p>
             <a:r>
-              <a:rPr lang="en-US" sz="1400" dirty="0" smtClean="0"/>
+              <a:rPr lang="en-US" sz="1400" dirty="0"/>
               <a:t>Save as</a:t>
             </a:r>
-            <a:endParaRPr lang="en-US" sz="1400" dirty="0"/>
           </a:p>
         </p:txBody>
       </p:sp>
@@ -4494,7 +4485,7 @@
           <p:cNvPr id="39" name="Straight Arrow Connector 38">
             <a:extLst>
               <a:ext uri="{FF2B5EF4-FFF2-40B4-BE49-F238E27FC236}">
-                <a16:creationId xmlns:a16="http://schemas.microsoft.com/office/drawing/2014/main" xmlns="" id="{588DDB9A-AB95-4FA6-8B6B-D0F37161E799}"/>
+                <a16:creationId xmlns:a16="http://schemas.microsoft.com/office/drawing/2014/main" id="{588DDB9A-AB95-4FA6-8B6B-D0F37161E799}"/>
               </a:ext>
             </a:extLst>
           </p:cNvPr>
@@ -4533,7 +4524,7 @@
           <p:cNvPr id="40" name="TextBox 39">
             <a:extLst>
               <a:ext uri="{FF2B5EF4-FFF2-40B4-BE49-F238E27FC236}">
-                <a16:creationId xmlns:a16="http://schemas.microsoft.com/office/drawing/2014/main" xmlns="" id="{20FBF2E3-F78B-437F-A383-84C582914762}"/>
+                <a16:creationId xmlns:a16="http://schemas.microsoft.com/office/drawing/2014/main" id="{20FBF2E3-F78B-437F-A383-84C582914762}"/>
               </a:ext>
             </a:extLst>
           </p:cNvPr>
@@ -4557,10 +4548,9 @@
           <a:lstStyle/>
           <a:p>
             <a:r>
-              <a:rPr lang="en-US" sz="1400" dirty="0" smtClean="0"/>
+              <a:rPr lang="en-US" sz="1400" dirty="0"/>
               <a:t>Exit</a:t>
             </a:r>
-            <a:endParaRPr lang="en-US" sz="1400" dirty="0"/>
           </a:p>
         </p:txBody>
       </p:sp>
@@ -4569,7 +4559,7 @@
           <p:cNvPr id="41" name="Straight Arrow Connector 40">
             <a:extLst>
               <a:ext uri="{FF2B5EF4-FFF2-40B4-BE49-F238E27FC236}">
-                <a16:creationId xmlns:a16="http://schemas.microsoft.com/office/drawing/2014/main" xmlns="" id="{588DDB9A-AB95-4FA6-8B6B-D0F37161E799}"/>
+                <a16:creationId xmlns:a16="http://schemas.microsoft.com/office/drawing/2014/main" id="{588DDB9A-AB95-4FA6-8B6B-D0F37161E799}"/>
               </a:ext>
             </a:extLst>
           </p:cNvPr>
@@ -4608,7 +4598,7 @@
           <p:cNvPr id="42" name="TextBox 41">
             <a:extLst>
               <a:ext uri="{FF2B5EF4-FFF2-40B4-BE49-F238E27FC236}">
-                <a16:creationId xmlns:a16="http://schemas.microsoft.com/office/drawing/2014/main" xmlns="" id="{20FBF2E3-F78B-437F-A383-84C582914762}"/>
+                <a16:creationId xmlns:a16="http://schemas.microsoft.com/office/drawing/2014/main" id="{20FBF2E3-F78B-437F-A383-84C582914762}"/>
               </a:ext>
             </a:extLst>
           </p:cNvPr>
@@ -4632,10 +4622,9 @@
           <a:lstStyle/>
           <a:p>
             <a:r>
-              <a:rPr lang="en-US" sz="1600" dirty="0" smtClean="0"/>
+              <a:rPr lang="en-US" sz="1600" dirty="0"/>
               <a:t>Edit</a:t>
             </a:r>
-            <a:endParaRPr lang="en-US" sz="1600" dirty="0"/>
           </a:p>
         </p:txBody>
       </p:sp>
@@ -4644,7 +4633,7 @@
           <p:cNvPr id="43" name="Straight Arrow Connector 42">
             <a:extLst>
               <a:ext uri="{FF2B5EF4-FFF2-40B4-BE49-F238E27FC236}">
-                <a16:creationId xmlns:a16="http://schemas.microsoft.com/office/drawing/2014/main" xmlns="" id="{588DDB9A-AB95-4FA6-8B6B-D0F37161E799}"/>
+                <a16:creationId xmlns:a16="http://schemas.microsoft.com/office/drawing/2014/main" id="{588DDB9A-AB95-4FA6-8B6B-D0F37161E799}"/>
               </a:ext>
             </a:extLst>
           </p:cNvPr>
@@ -4683,7 +4672,7 @@
           <p:cNvPr id="44" name="Straight Arrow Connector 43">
             <a:extLst>
               <a:ext uri="{FF2B5EF4-FFF2-40B4-BE49-F238E27FC236}">
-                <a16:creationId xmlns:a16="http://schemas.microsoft.com/office/drawing/2014/main" xmlns="" id="{588DDB9A-AB95-4FA6-8B6B-D0F37161E799}"/>
+                <a16:creationId xmlns:a16="http://schemas.microsoft.com/office/drawing/2014/main" id="{588DDB9A-AB95-4FA6-8B6B-D0F37161E799}"/>
               </a:ext>
             </a:extLst>
           </p:cNvPr>
@@ -4722,7 +4711,7 @@
           <p:cNvPr id="45" name="TextBox 44">
             <a:extLst>
               <a:ext uri="{FF2B5EF4-FFF2-40B4-BE49-F238E27FC236}">
-                <a16:creationId xmlns:a16="http://schemas.microsoft.com/office/drawing/2014/main" xmlns="" id="{20FBF2E3-F78B-437F-A383-84C582914762}"/>
+                <a16:creationId xmlns:a16="http://schemas.microsoft.com/office/drawing/2014/main" id="{20FBF2E3-F78B-437F-A383-84C582914762}"/>
               </a:ext>
             </a:extLst>
           </p:cNvPr>
@@ -4746,10 +4735,9 @@
           <a:lstStyle/>
           <a:p>
             <a:r>
-              <a:rPr lang="en-US" sz="1600" dirty="0" smtClean="0"/>
+              <a:rPr lang="en-US" sz="1600" dirty="0"/>
               <a:t>Back</a:t>
             </a:r>
-            <a:endParaRPr lang="en-US" sz="1600" dirty="0"/>
           </a:p>
         </p:txBody>
       </p:sp>
@@ -4758,7 +4746,7 @@
           <p:cNvPr id="46" name="Straight Arrow Connector 45">
             <a:extLst>
               <a:ext uri="{FF2B5EF4-FFF2-40B4-BE49-F238E27FC236}">
-                <a16:creationId xmlns:a16="http://schemas.microsoft.com/office/drawing/2014/main" xmlns="" id="{588DDB9A-AB95-4FA6-8B6B-D0F37161E799}"/>
+                <a16:creationId xmlns:a16="http://schemas.microsoft.com/office/drawing/2014/main" id="{588DDB9A-AB95-4FA6-8B6B-D0F37161E799}"/>
               </a:ext>
             </a:extLst>
           </p:cNvPr>
@@ -4797,7 +4785,7 @@
           <p:cNvPr id="47" name="TextBox 46">
             <a:extLst>
               <a:ext uri="{FF2B5EF4-FFF2-40B4-BE49-F238E27FC236}">
-                <a16:creationId xmlns:a16="http://schemas.microsoft.com/office/drawing/2014/main" xmlns="" id="{20FBF2E3-F78B-437F-A383-84C582914762}"/>
+                <a16:creationId xmlns:a16="http://schemas.microsoft.com/office/drawing/2014/main" id="{20FBF2E3-F78B-437F-A383-84C582914762}"/>
               </a:ext>
             </a:extLst>
           </p:cNvPr>
@@ -4821,10 +4809,9 @@
           <a:lstStyle/>
           <a:p>
             <a:r>
-              <a:rPr lang="en-US" sz="1600" dirty="0" smtClean="0"/>
+              <a:rPr lang="en-US" sz="1600" dirty="0"/>
               <a:t>Forward</a:t>
             </a:r>
-            <a:endParaRPr lang="en-US" sz="1600" dirty="0"/>
           </a:p>
         </p:txBody>
       </p:sp>
@@ -4833,7 +4820,7 @@
           <p:cNvPr id="48" name="Straight Arrow Connector 47">
             <a:extLst>
               <a:ext uri="{FF2B5EF4-FFF2-40B4-BE49-F238E27FC236}">
-                <a16:creationId xmlns:a16="http://schemas.microsoft.com/office/drawing/2014/main" xmlns="" id="{588DDB9A-AB95-4FA6-8B6B-D0F37161E799}"/>
+                <a16:creationId xmlns:a16="http://schemas.microsoft.com/office/drawing/2014/main" id="{588DDB9A-AB95-4FA6-8B6B-D0F37161E799}"/>
               </a:ext>
             </a:extLst>
           </p:cNvPr>
@@ -4872,7 +4859,7 @@
           <p:cNvPr id="49" name="TextBox 48">
             <a:extLst>
               <a:ext uri="{FF2B5EF4-FFF2-40B4-BE49-F238E27FC236}">
-                <a16:creationId xmlns:a16="http://schemas.microsoft.com/office/drawing/2014/main" xmlns="" id="{20FBF2E3-F78B-437F-A383-84C582914762}"/>
+                <a16:creationId xmlns:a16="http://schemas.microsoft.com/office/drawing/2014/main" id="{20FBF2E3-F78B-437F-A383-84C582914762}"/>
               </a:ext>
             </a:extLst>
           </p:cNvPr>
@@ -4896,10 +4883,9 @@
           <a:lstStyle/>
           <a:p>
             <a:r>
-              <a:rPr lang="en-US" sz="1600" dirty="0" smtClean="0"/>
+              <a:rPr lang="en-US" sz="1600" dirty="0"/>
               <a:t>Home</a:t>
             </a:r>
-            <a:endParaRPr lang="en-US" sz="1600" dirty="0"/>
           </a:p>
         </p:txBody>
       </p:sp>
@@ -4908,7 +4894,7 @@
           <p:cNvPr id="50" name="Straight Arrow Connector 49">
             <a:extLst>
               <a:ext uri="{FF2B5EF4-FFF2-40B4-BE49-F238E27FC236}">
-                <a16:creationId xmlns:a16="http://schemas.microsoft.com/office/drawing/2014/main" xmlns="" id="{588DDB9A-AB95-4FA6-8B6B-D0F37161E799}"/>
+                <a16:creationId xmlns:a16="http://schemas.microsoft.com/office/drawing/2014/main" id="{588DDB9A-AB95-4FA6-8B6B-D0F37161E799}"/>
               </a:ext>
             </a:extLst>
           </p:cNvPr>
@@ -4947,7 +4933,7 @@
           <p:cNvPr id="51" name="TextBox 50">
             <a:extLst>
               <a:ext uri="{FF2B5EF4-FFF2-40B4-BE49-F238E27FC236}">
-                <a16:creationId xmlns:a16="http://schemas.microsoft.com/office/drawing/2014/main" xmlns="" id="{20FBF2E3-F78B-437F-A383-84C582914762}"/>
+                <a16:creationId xmlns:a16="http://schemas.microsoft.com/office/drawing/2014/main" id="{20FBF2E3-F78B-437F-A383-84C582914762}"/>
               </a:ext>
             </a:extLst>
           </p:cNvPr>
@@ -4971,10 +4957,9 @@
           <a:lstStyle/>
           <a:p>
             <a:r>
-              <a:rPr lang="en-US" sz="1600" dirty="0" smtClean="0"/>
+              <a:rPr lang="en-US" sz="1600" dirty="0"/>
               <a:t>Information</a:t>
             </a:r>
-            <a:endParaRPr lang="en-US" sz="1600" dirty="0"/>
           </a:p>
         </p:txBody>
       </p:sp>
@@ -4983,7 +4968,7 @@
           <p:cNvPr id="52" name="Straight Arrow Connector 51">
             <a:extLst>
               <a:ext uri="{FF2B5EF4-FFF2-40B4-BE49-F238E27FC236}">
-                <a16:creationId xmlns:a16="http://schemas.microsoft.com/office/drawing/2014/main" xmlns="" id="{588DDB9A-AB95-4FA6-8B6B-D0F37161E799}"/>
+                <a16:creationId xmlns:a16="http://schemas.microsoft.com/office/drawing/2014/main" id="{588DDB9A-AB95-4FA6-8B6B-D0F37161E799}"/>
               </a:ext>
             </a:extLst>
           </p:cNvPr>
@@ -5022,7 +5007,7 @@
           <p:cNvPr id="53" name="TextBox 52">
             <a:extLst>
               <a:ext uri="{FF2B5EF4-FFF2-40B4-BE49-F238E27FC236}">
-                <a16:creationId xmlns:a16="http://schemas.microsoft.com/office/drawing/2014/main" xmlns="" id="{20FBF2E3-F78B-437F-A383-84C582914762}"/>
+                <a16:creationId xmlns:a16="http://schemas.microsoft.com/office/drawing/2014/main" id="{20FBF2E3-F78B-437F-A383-84C582914762}"/>
               </a:ext>
             </a:extLst>
           </p:cNvPr>
@@ -5046,10 +5031,9 @@
           <a:lstStyle/>
           <a:p>
             <a:r>
-              <a:rPr lang="en-US" sz="1600" dirty="0" smtClean="0"/>
+              <a:rPr lang="en-US" sz="1600" dirty="0"/>
               <a:t>Edit</a:t>
             </a:r>
-            <a:endParaRPr lang="en-US" sz="1600" dirty="0"/>
           </a:p>
         </p:txBody>
       </p:sp>
@@ -5058,7 +5042,7 @@
           <p:cNvPr id="54" name="Straight Arrow Connector 53">
             <a:extLst>
               <a:ext uri="{FF2B5EF4-FFF2-40B4-BE49-F238E27FC236}">
-                <a16:creationId xmlns:a16="http://schemas.microsoft.com/office/drawing/2014/main" xmlns="" id="{588DDB9A-AB95-4FA6-8B6B-D0F37161E799}"/>
+                <a16:creationId xmlns:a16="http://schemas.microsoft.com/office/drawing/2014/main" id="{588DDB9A-AB95-4FA6-8B6B-D0F37161E799}"/>
               </a:ext>
             </a:extLst>
           </p:cNvPr>
@@ -5097,7 +5081,7 @@
           <p:cNvPr id="55" name="TextBox 54">
             <a:extLst>
               <a:ext uri="{FF2B5EF4-FFF2-40B4-BE49-F238E27FC236}">
-                <a16:creationId xmlns:a16="http://schemas.microsoft.com/office/drawing/2014/main" xmlns="" id="{20FBF2E3-F78B-437F-A383-84C582914762}"/>
+                <a16:creationId xmlns:a16="http://schemas.microsoft.com/office/drawing/2014/main" id="{20FBF2E3-F78B-437F-A383-84C582914762}"/>
               </a:ext>
             </a:extLst>
           </p:cNvPr>
@@ -5121,10 +5105,9 @@
           <a:lstStyle/>
           <a:p>
             <a:r>
-              <a:rPr lang="en-US" sz="1600" dirty="0" smtClean="0"/>
+              <a:rPr lang="en-US" sz="1600" dirty="0"/>
               <a:t>Search</a:t>
             </a:r>
-            <a:endParaRPr lang="en-US" sz="1600" dirty="0"/>
           </a:p>
         </p:txBody>
       </p:sp>
@@ -5133,7 +5116,7 @@
           <p:cNvPr id="56" name="Straight Arrow Connector 55">
             <a:extLst>
               <a:ext uri="{FF2B5EF4-FFF2-40B4-BE49-F238E27FC236}">
-                <a16:creationId xmlns:a16="http://schemas.microsoft.com/office/drawing/2014/main" xmlns="" id="{588DDB9A-AB95-4FA6-8B6B-D0F37161E799}"/>
+                <a16:creationId xmlns:a16="http://schemas.microsoft.com/office/drawing/2014/main" id="{588DDB9A-AB95-4FA6-8B6B-D0F37161E799}"/>
               </a:ext>
             </a:extLst>
           </p:cNvPr>
@@ -5172,7 +5155,7 @@
           <p:cNvPr id="57" name="Straight Arrow Connector 56">
             <a:extLst>
               <a:ext uri="{FF2B5EF4-FFF2-40B4-BE49-F238E27FC236}">
-                <a16:creationId xmlns:a16="http://schemas.microsoft.com/office/drawing/2014/main" xmlns="" id="{588DDB9A-AB95-4FA6-8B6B-D0F37161E799}"/>
+                <a16:creationId xmlns:a16="http://schemas.microsoft.com/office/drawing/2014/main" id="{588DDB9A-AB95-4FA6-8B6B-D0F37161E799}"/>
               </a:ext>
             </a:extLst>
           </p:cNvPr>
@@ -5211,7 +5194,7 @@
           <p:cNvPr id="58" name="Straight Arrow Connector 57">
             <a:extLst>
               <a:ext uri="{FF2B5EF4-FFF2-40B4-BE49-F238E27FC236}">
-                <a16:creationId xmlns:a16="http://schemas.microsoft.com/office/drawing/2014/main" xmlns="" id="{588DDB9A-AB95-4FA6-8B6B-D0F37161E799}"/>
+                <a16:creationId xmlns:a16="http://schemas.microsoft.com/office/drawing/2014/main" id="{588DDB9A-AB95-4FA6-8B6B-D0F37161E799}"/>
               </a:ext>
             </a:extLst>
           </p:cNvPr>
@@ -5250,7 +5233,7 @@
           <p:cNvPr id="59" name="TextBox 58">
             <a:extLst>
               <a:ext uri="{FF2B5EF4-FFF2-40B4-BE49-F238E27FC236}">
-                <a16:creationId xmlns:a16="http://schemas.microsoft.com/office/drawing/2014/main" xmlns="" id="{20FBF2E3-F78B-437F-A383-84C582914762}"/>
+                <a16:creationId xmlns:a16="http://schemas.microsoft.com/office/drawing/2014/main" id="{20FBF2E3-F78B-437F-A383-84C582914762}"/>
               </a:ext>
             </a:extLst>
           </p:cNvPr>
@@ -5274,10 +5257,9 @@
           <a:lstStyle/>
           <a:p>
             <a:r>
-              <a:rPr lang="en-US" sz="1600" dirty="0" smtClean="0"/>
+              <a:rPr lang="en-US" sz="1600" dirty="0"/>
               <a:t>Cut</a:t>
             </a:r>
-            <a:endParaRPr lang="en-US" sz="1600" dirty="0"/>
           </a:p>
         </p:txBody>
       </p:sp>
@@ -5286,7 +5268,7 @@
           <p:cNvPr id="60" name="Straight Arrow Connector 59">
             <a:extLst>
               <a:ext uri="{FF2B5EF4-FFF2-40B4-BE49-F238E27FC236}">
-                <a16:creationId xmlns:a16="http://schemas.microsoft.com/office/drawing/2014/main" xmlns="" id="{588DDB9A-AB95-4FA6-8B6B-D0F37161E799}"/>
+                <a16:creationId xmlns:a16="http://schemas.microsoft.com/office/drawing/2014/main" id="{588DDB9A-AB95-4FA6-8B6B-D0F37161E799}"/>
               </a:ext>
             </a:extLst>
           </p:cNvPr>
@@ -5325,7 +5307,7 @@
           <p:cNvPr id="61" name="TextBox 60">
             <a:extLst>
               <a:ext uri="{FF2B5EF4-FFF2-40B4-BE49-F238E27FC236}">
-                <a16:creationId xmlns:a16="http://schemas.microsoft.com/office/drawing/2014/main" xmlns="" id="{20FBF2E3-F78B-437F-A383-84C582914762}"/>
+                <a16:creationId xmlns:a16="http://schemas.microsoft.com/office/drawing/2014/main" id="{20FBF2E3-F78B-437F-A383-84C582914762}"/>
               </a:ext>
             </a:extLst>
           </p:cNvPr>
@@ -5349,10 +5331,9 @@
           <a:lstStyle/>
           <a:p>
             <a:r>
-              <a:rPr lang="en-US" sz="1600" dirty="0" smtClean="0"/>
+              <a:rPr lang="en-US" sz="1600" dirty="0"/>
               <a:t>Copy</a:t>
             </a:r>
-            <a:endParaRPr lang="en-US" sz="1600" dirty="0"/>
           </a:p>
         </p:txBody>
       </p:sp>
@@ -5361,7 +5342,7 @@
           <p:cNvPr id="62" name="Straight Arrow Connector 61">
             <a:extLst>
               <a:ext uri="{FF2B5EF4-FFF2-40B4-BE49-F238E27FC236}">
-                <a16:creationId xmlns:a16="http://schemas.microsoft.com/office/drawing/2014/main" xmlns="" id="{588DDB9A-AB95-4FA6-8B6B-D0F37161E799}"/>
+                <a16:creationId xmlns:a16="http://schemas.microsoft.com/office/drawing/2014/main" id="{588DDB9A-AB95-4FA6-8B6B-D0F37161E799}"/>
               </a:ext>
             </a:extLst>
           </p:cNvPr>
@@ -5400,7 +5381,7 @@
           <p:cNvPr id="63" name="TextBox 62">
             <a:extLst>
               <a:ext uri="{FF2B5EF4-FFF2-40B4-BE49-F238E27FC236}">
-                <a16:creationId xmlns:a16="http://schemas.microsoft.com/office/drawing/2014/main" xmlns="" id="{20FBF2E3-F78B-437F-A383-84C582914762}"/>
+                <a16:creationId xmlns:a16="http://schemas.microsoft.com/office/drawing/2014/main" id="{20FBF2E3-F78B-437F-A383-84C582914762}"/>
               </a:ext>
             </a:extLst>
           </p:cNvPr>
@@ -5424,10 +5405,9 @@
           <a:lstStyle/>
           <a:p>
             <a:r>
-              <a:rPr lang="en-US" sz="1600" dirty="0" smtClean="0"/>
+              <a:rPr lang="en-US" sz="1600" dirty="0"/>
               <a:t>Undo</a:t>
             </a:r>
-            <a:endParaRPr lang="en-US" sz="1600" dirty="0"/>
           </a:p>
         </p:txBody>
       </p:sp>
@@ -5436,7 +5416,7 @@
           <p:cNvPr id="64" name="Straight Arrow Connector 63">
             <a:extLst>
               <a:ext uri="{FF2B5EF4-FFF2-40B4-BE49-F238E27FC236}">
-                <a16:creationId xmlns:a16="http://schemas.microsoft.com/office/drawing/2014/main" xmlns="" id="{588DDB9A-AB95-4FA6-8B6B-D0F37161E799}"/>
+                <a16:creationId xmlns:a16="http://schemas.microsoft.com/office/drawing/2014/main" id="{588DDB9A-AB95-4FA6-8B6B-D0F37161E799}"/>
               </a:ext>
             </a:extLst>
           </p:cNvPr>
@@ -5475,7 +5455,7 @@
           <p:cNvPr id="65" name="TextBox 64">
             <a:extLst>
               <a:ext uri="{FF2B5EF4-FFF2-40B4-BE49-F238E27FC236}">
-                <a16:creationId xmlns:a16="http://schemas.microsoft.com/office/drawing/2014/main" xmlns="" id="{20FBF2E3-F78B-437F-A383-84C582914762}"/>
+                <a16:creationId xmlns:a16="http://schemas.microsoft.com/office/drawing/2014/main" id="{20FBF2E3-F78B-437F-A383-84C582914762}"/>
               </a:ext>
             </a:extLst>
           </p:cNvPr>
@@ -5499,10 +5479,9 @@
           <a:lstStyle/>
           <a:p>
             <a:r>
-              <a:rPr lang="en-US" sz="1600" dirty="0" smtClean="0"/>
+              <a:rPr lang="en-US" sz="1600" dirty="0"/>
               <a:t>Redo</a:t>
             </a:r>
-            <a:endParaRPr lang="en-US" sz="1600" dirty="0"/>
           </a:p>
         </p:txBody>
       </p:sp>
@@ -5511,7 +5490,7 @@
           <p:cNvPr id="66" name="Straight Arrow Connector 65">
             <a:extLst>
               <a:ext uri="{FF2B5EF4-FFF2-40B4-BE49-F238E27FC236}">
-                <a16:creationId xmlns:a16="http://schemas.microsoft.com/office/drawing/2014/main" xmlns="" id="{588DDB9A-AB95-4FA6-8B6B-D0F37161E799}"/>
+                <a16:creationId xmlns:a16="http://schemas.microsoft.com/office/drawing/2014/main" id="{588DDB9A-AB95-4FA6-8B6B-D0F37161E799}"/>
               </a:ext>
             </a:extLst>
           </p:cNvPr>
@@ -5550,7 +5529,7 @@
           <p:cNvPr id="67" name="TextBox 66">
             <a:extLst>
               <a:ext uri="{FF2B5EF4-FFF2-40B4-BE49-F238E27FC236}">
-                <a16:creationId xmlns:a16="http://schemas.microsoft.com/office/drawing/2014/main" xmlns="" id="{20FBF2E3-F78B-437F-A383-84C582914762}"/>
+                <a16:creationId xmlns:a16="http://schemas.microsoft.com/office/drawing/2014/main" id="{20FBF2E3-F78B-437F-A383-84C582914762}"/>
               </a:ext>
             </a:extLst>
           </p:cNvPr>
@@ -5574,11 +5553,11 @@
           <a:lstStyle/>
           <a:p>
             <a:r>
-              <a:rPr lang="en-US" sz="1600" dirty="0" smtClean="0"/>
+              <a:rPr lang="en-US" sz="1600" dirty="0"/>
               <a:t>Save &amp; </a:t>
             </a:r>
             <a:r>
-              <a:rPr lang="en-US" sz="1600" dirty="0" err="1" smtClean="0"/>
+              <a:rPr lang="en-US" sz="1600" dirty="0" err="1"/>
               <a:t>Dispaly</a:t>
             </a:r>
             <a:endParaRPr lang="en-US" sz="1600" dirty="0"/>
@@ -5590,7 +5569,7 @@
           <p:cNvPr id="68" name="Straight Arrow Connector 67">
             <a:extLst>
               <a:ext uri="{FF2B5EF4-FFF2-40B4-BE49-F238E27FC236}">
-                <a16:creationId xmlns:a16="http://schemas.microsoft.com/office/drawing/2014/main" xmlns="" id="{588DDB9A-AB95-4FA6-8B6B-D0F37161E799}"/>
+                <a16:creationId xmlns:a16="http://schemas.microsoft.com/office/drawing/2014/main" id="{588DDB9A-AB95-4FA6-8B6B-D0F37161E799}"/>
               </a:ext>
             </a:extLst>
           </p:cNvPr>
@@ -5629,7 +5608,7 @@
           <p:cNvPr id="70" name="Straight Arrow Connector 69">
             <a:extLst>
               <a:ext uri="{FF2B5EF4-FFF2-40B4-BE49-F238E27FC236}">
-                <a16:creationId xmlns:a16="http://schemas.microsoft.com/office/drawing/2014/main" xmlns="" id="{588DDB9A-AB95-4FA6-8B6B-D0F37161E799}"/>
+                <a16:creationId xmlns:a16="http://schemas.microsoft.com/office/drawing/2014/main" id="{588DDB9A-AB95-4FA6-8B6B-D0F37161E799}"/>
               </a:ext>
             </a:extLst>
           </p:cNvPr>
@@ -5668,7 +5647,7 @@
           <p:cNvPr id="71" name="TextBox 70">
             <a:extLst>
               <a:ext uri="{FF2B5EF4-FFF2-40B4-BE49-F238E27FC236}">
-                <a16:creationId xmlns:a16="http://schemas.microsoft.com/office/drawing/2014/main" xmlns="" id="{20FBF2E3-F78B-437F-A383-84C582914762}"/>
+                <a16:creationId xmlns:a16="http://schemas.microsoft.com/office/drawing/2014/main" id="{20FBF2E3-F78B-437F-A383-84C582914762}"/>
               </a:ext>
             </a:extLst>
           </p:cNvPr>
@@ -5692,10 +5671,9 @@
           <a:lstStyle/>
           <a:p>
             <a:r>
-              <a:rPr lang="en-US" sz="1600" dirty="0" smtClean="0"/>
+              <a:rPr lang="en-US" sz="1600" dirty="0"/>
               <a:t>Display</a:t>
             </a:r>
-            <a:endParaRPr lang="en-US" sz="1600" dirty="0"/>
           </a:p>
         </p:txBody>
       </p:sp>
@@ -5704,7 +5682,7 @@
           <p:cNvPr id="73" name="Straight Arrow Connector 72">
             <a:extLst>
               <a:ext uri="{FF2B5EF4-FFF2-40B4-BE49-F238E27FC236}">
-                <a16:creationId xmlns:a16="http://schemas.microsoft.com/office/drawing/2014/main" xmlns="" id="{588DDB9A-AB95-4FA6-8B6B-D0F37161E799}"/>
+                <a16:creationId xmlns:a16="http://schemas.microsoft.com/office/drawing/2014/main" id="{588DDB9A-AB95-4FA6-8B6B-D0F37161E799}"/>
               </a:ext>
             </a:extLst>
           </p:cNvPr>
@@ -5743,7 +5721,7 @@
           <p:cNvPr id="74" name="TextBox 73">
             <a:extLst>
               <a:ext uri="{FF2B5EF4-FFF2-40B4-BE49-F238E27FC236}">
-                <a16:creationId xmlns:a16="http://schemas.microsoft.com/office/drawing/2014/main" xmlns="" id="{20FBF2E3-F78B-437F-A383-84C582914762}"/>
+                <a16:creationId xmlns:a16="http://schemas.microsoft.com/office/drawing/2014/main" id="{20FBF2E3-F78B-437F-A383-84C582914762}"/>
               </a:ext>
             </a:extLst>
           </p:cNvPr>
@@ -5767,10 +5745,9 @@
           <a:lstStyle/>
           <a:p>
             <a:r>
-              <a:rPr lang="en-US" sz="1600" dirty="0" smtClean="0"/>
+              <a:rPr lang="en-US" sz="1600" dirty="0"/>
               <a:t>Edit</a:t>
             </a:r>
-            <a:endParaRPr lang="en-US" sz="1600" dirty="0"/>
           </a:p>
         </p:txBody>
       </p:sp>
@@ -5779,7 +5756,7 @@
           <p:cNvPr id="75" name="TextBox 74">
             <a:extLst>
               <a:ext uri="{FF2B5EF4-FFF2-40B4-BE49-F238E27FC236}">
-                <a16:creationId xmlns:a16="http://schemas.microsoft.com/office/drawing/2014/main" xmlns="" id="{20FBF2E3-F78B-437F-A383-84C582914762}"/>
+                <a16:creationId xmlns:a16="http://schemas.microsoft.com/office/drawing/2014/main" id="{20FBF2E3-F78B-437F-A383-84C582914762}"/>
               </a:ext>
             </a:extLst>
           </p:cNvPr>
@@ -5803,10 +5780,9 @@
           <a:lstStyle/>
           <a:p>
             <a:r>
-              <a:rPr lang="en-US" sz="1600" dirty="0" smtClean="0"/>
+              <a:rPr lang="en-US" sz="1600" dirty="0"/>
               <a:t>Save</a:t>
             </a:r>
-            <a:endParaRPr lang="en-US" sz="1600" dirty="0"/>
           </a:p>
         </p:txBody>
       </p:sp>
@@ -5815,7 +5791,7 @@
           <p:cNvPr id="78" name="Straight Arrow Connector 77">
             <a:extLst>
               <a:ext uri="{FF2B5EF4-FFF2-40B4-BE49-F238E27FC236}">
-                <a16:creationId xmlns:a16="http://schemas.microsoft.com/office/drawing/2014/main" xmlns="" id="{588DDB9A-AB95-4FA6-8B6B-D0F37161E799}"/>
+                <a16:creationId xmlns:a16="http://schemas.microsoft.com/office/drawing/2014/main" id="{588DDB9A-AB95-4FA6-8B6B-D0F37161E799}"/>
               </a:ext>
             </a:extLst>
           </p:cNvPr>
@@ -5854,7 +5830,7 @@
           <p:cNvPr id="79" name="TextBox 78">
             <a:extLst>
               <a:ext uri="{FF2B5EF4-FFF2-40B4-BE49-F238E27FC236}">
-                <a16:creationId xmlns:a16="http://schemas.microsoft.com/office/drawing/2014/main" xmlns="" id="{20FBF2E3-F78B-437F-A383-84C582914762}"/>
+                <a16:creationId xmlns:a16="http://schemas.microsoft.com/office/drawing/2014/main" id="{20FBF2E3-F78B-437F-A383-84C582914762}"/>
               </a:ext>
             </a:extLst>
           </p:cNvPr>
@@ -5878,10 +5854,9 @@
           <a:lstStyle/>
           <a:p>
             <a:r>
-              <a:rPr lang="en-US" sz="1600" dirty="0" smtClean="0"/>
+              <a:rPr lang="en-US" sz="1600" dirty="0"/>
               <a:t>search</a:t>
             </a:r>
-            <a:endParaRPr lang="en-US" sz="1600" dirty="0"/>
           </a:p>
         </p:txBody>
       </p:sp>
@@ -5931,10 +5906,9 @@
           <a:lstStyle/>
           <a:p>
             <a:r>
-              <a:rPr lang="en-US" dirty="0" smtClean="0"/>
+              <a:rPr lang="en-US" dirty="0"/>
               <a:t>Link Bar</a:t>
             </a:r>
-            <a:endParaRPr lang="en-US" dirty="0"/>
           </a:p>
         </p:txBody>
       </p:sp>
@@ -5974,11 +5948,7 @@
             </a:r>
             <a:r>
               <a:rPr lang="en-US" dirty="0"/>
-              <a:t> Button</a:t>
-            </a:r>
-            <a:r>
-              <a:rPr lang="en-US" dirty="0" smtClean="0"/>
-              <a:t>]</a:t>
+              <a:t> Button]</a:t>
             </a:r>
           </a:p>
           <a:p>
@@ -6060,10 +6030,9 @@
           <a:lstStyle/>
           <a:p>
             <a:r>
-              <a:rPr lang="en-US" dirty="0" smtClean="0"/>
+              <a:rPr lang="en-US" dirty="0"/>
               <a:t>Text Styles</a:t>
             </a:r>
-            <a:endParaRPr lang="en-US" dirty="0"/>
           </a:p>
         </p:txBody>
       </p:sp>
@@ -6140,7 +6109,6 @@
               <a:rPr lang="en-US" dirty="0"/>
               <a:t>	&lt;x&gt;...&lt;/x&gt;  -- Strikeout </a:t>
             </a:r>
-            <a:endParaRPr lang="en-US" dirty="0" smtClean="0"/>
           </a:p>
           <a:p>
             <a:endParaRPr lang="en-US" dirty="0"/>
@@ -6217,10 +6185,9 @@
           <a:lstStyle/>
           <a:p>
             <a:r>
-              <a:rPr lang="en-US" dirty="0" smtClean="0"/>
+              <a:rPr lang="en-US" dirty="0"/>
               <a:t>Section Headers</a:t>
             </a:r>
-            <a:endParaRPr lang="en-US" dirty="0"/>
           </a:p>
         </p:txBody>
       </p:sp>
@@ -6256,11 +6223,11 @@
             </a:r>
           </a:p>
           <a:p>
-            <a:endParaRPr lang="en-US" smtClean="0"/>
-          </a:p>
-          <a:p>
-            <a:r>
-              <a:rPr lang="en-US" smtClean="0"/>
+            <a:endParaRPr lang="en-US"/>
+          </a:p>
+          <a:p>
+            <a:r>
+              <a:rPr lang="en-US"/>
               <a:t>== </a:t>
             </a:r>
             <a:r>
@@ -6313,6 +6280,145 @@
     <p:extLst>
       <p:ext uri="{BB962C8B-B14F-4D97-AF65-F5344CB8AC3E}">
         <p14:creationId xmlns:p14="http://schemas.microsoft.com/office/powerpoint/2010/main" val="3014659890"/>
+      </p:ext>
+    </p:extLst>
+  </p:cSld>
+  <p:clrMapOvr>
+    <a:masterClrMapping/>
+  </p:clrMapOvr>
+</p:sld>
+</file>
+
+<file path=ppt/slides/slide6.xml><?xml version="1.0" encoding="utf-8"?>
+<p:sld xmlns:a="http://schemas.openxmlformats.org/drawingml/2006/main" xmlns:r="http://schemas.openxmlformats.org/officeDocument/2006/relationships" xmlns:p="http://schemas.openxmlformats.org/presentationml/2006/main">
+  <p:cSld>
+    <p:spTree>
+      <p:nvGrpSpPr>
+        <p:cNvPr id="1" name=""/>
+        <p:cNvGrpSpPr/>
+        <p:nvPr/>
+      </p:nvGrpSpPr>
+      <p:grpSpPr>
+        <a:xfrm>
+          <a:off x="0" y="0"/>
+          <a:ext cx="0" cy="0"/>
+          <a:chOff x="0" y="0"/>
+          <a:chExt cx="0" cy="0"/>
+        </a:xfrm>
+      </p:grpSpPr>
+      <p:sp>
+        <p:nvSpPr>
+          <p:cNvPr id="2" name="Title 1"/>
+          <p:cNvSpPr>
+            <a:spLocks noGrp="1"/>
+          </p:cNvSpPr>
+          <p:nvPr>
+            <p:ph type="title"/>
+          </p:nvPr>
+        </p:nvSpPr>
+        <p:spPr/>
+        <p:txBody>
+          <a:bodyPr/>
+          <a:lstStyle/>
+          <a:p>
+            <a:r>
+              <a:rPr lang="en-US" dirty="0"/>
+              <a:t>Tips</a:t>
+            </a:r>
+          </a:p>
+        </p:txBody>
+      </p:sp>
+      <p:sp>
+        <p:nvSpPr>
+          <p:cNvPr id="5" name="Content Placeholder 4">
+            <a:extLst>
+              <a:ext uri="{FF2B5EF4-FFF2-40B4-BE49-F238E27FC236}">
+                <a16:creationId xmlns:a16="http://schemas.microsoft.com/office/drawing/2014/main" id="{1C952240-7AD5-4405-BC87-DFAE86F8BD21}"/>
+              </a:ext>
+            </a:extLst>
+          </p:cNvPr>
+          <p:cNvSpPr>
+            <a:spLocks noGrp="1"/>
+          </p:cNvSpPr>
+          <p:nvPr>
+            <p:ph idx="1"/>
+          </p:nvPr>
+        </p:nvSpPr>
+        <p:spPr/>
+        <p:txBody>
+          <a:bodyPr/>
+          <a:lstStyle/>
+          <a:p>
+            <a:r>
+              <a:rPr lang="en-US" dirty="0"/>
+              <a:t>Double click notebook.bat to recompile all the java</a:t>
+            </a:r>
+          </a:p>
+          <a:p>
+            <a:r>
+              <a:rPr lang="en-US" dirty="0"/>
+              <a:t>In the bat:</a:t>
+            </a:r>
+          </a:p>
+          <a:p>
+            <a:pPr marL="457200" lvl="1" indent="0">
+              <a:buNone/>
+            </a:pPr>
+            <a:r>
+              <a:rPr lang="en-US" dirty="0" err="1"/>
+              <a:t>javac</a:t>
+            </a:r>
+            <a:r>
+              <a:rPr lang="en-US" dirty="0"/>
+              <a:t> ./com/notebook/ButtonProcess.java</a:t>
+            </a:r>
+          </a:p>
+          <a:p>
+            <a:pPr marL="457200" lvl="1" indent="0">
+              <a:buNone/>
+            </a:pPr>
+            <a:r>
+              <a:rPr lang="en-US" dirty="0" err="1"/>
+              <a:t>javac</a:t>
+            </a:r>
+            <a:r>
+              <a:rPr lang="en-US" dirty="0"/>
+              <a:t> ./com/notebook/SearchProcess.java</a:t>
+            </a:r>
+          </a:p>
+          <a:p>
+            <a:pPr marL="457200" lvl="1" indent="0">
+              <a:buNone/>
+            </a:pPr>
+            <a:r>
+              <a:rPr lang="en-US" dirty="0" err="1"/>
+              <a:t>javac</a:t>
+            </a:r>
+            <a:r>
+              <a:rPr lang="en-US" dirty="0"/>
+              <a:t> NoteBook.java</a:t>
+            </a:r>
+          </a:p>
+          <a:p>
+            <a:pPr marL="457200" lvl="1" indent="0">
+              <a:buNone/>
+            </a:pPr>
+            <a:r>
+              <a:rPr lang="en-US" dirty="0"/>
+              <a:t>java </a:t>
+            </a:r>
+            <a:r>
+              <a:rPr lang="en-US" dirty="0" err="1"/>
+              <a:t>NoteBook</a:t>
+            </a:r>
+            <a:endParaRPr lang="en-US" dirty="0"/>
+          </a:p>
+        </p:txBody>
+      </p:sp>
+    </p:spTree>
+    <p:extLst>
+      <p:ext uri="{BB962C8B-B14F-4D97-AF65-F5344CB8AC3E}">
+        <p14:creationId xmlns:p14="http://schemas.microsoft.com/office/powerpoint/2010/main" val="3897524501"/>
       </p:ext>
     </p:extLst>
   </p:cSld>

</xml_diff>

<commit_message>
Resize the image if it is too big; Add open image link for open by windows default program
</commit_message>
<xml_diff>
--- a/record.pptx
+++ b/record.pptx
@@ -10,7 +10,8 @@
     <p:sldId id="259" r:id="rId4"/>
     <p:sldId id="260" r:id="rId5"/>
     <p:sldId id="261" r:id="rId6"/>
-    <p:sldId id="262" r:id="rId7"/>
+    <p:sldId id="263" r:id="rId7"/>
+    <p:sldId id="262" r:id="rId8"/>
   </p:sldIdLst>
   <p:sldSz cx="12192000" cy="6858000"/>
   <p:notesSz cx="6858000" cy="9144000"/>
@@ -257,7 +258,7 @@
           <a:p>
             <a:fld id="{BD371D8B-6EEF-4666-9EDE-D125F1A89B84}" type="datetimeFigureOut">
               <a:rPr lang="en-US" smtClean="0"/>
-              <a:t>1/17/2019</a:t>
+              <a:t>2/1/2019</a:t>
             </a:fld>
             <a:endParaRPr lang="en-US"/>
           </a:p>
@@ -425,7 +426,7 @@
           <a:p>
             <a:fld id="{BD371D8B-6EEF-4666-9EDE-D125F1A89B84}" type="datetimeFigureOut">
               <a:rPr lang="en-US" smtClean="0"/>
-              <a:t>1/17/2019</a:t>
+              <a:t>2/1/2019</a:t>
             </a:fld>
             <a:endParaRPr lang="en-US"/>
           </a:p>
@@ -603,7 +604,7 @@
           <a:p>
             <a:fld id="{BD371D8B-6EEF-4666-9EDE-D125F1A89B84}" type="datetimeFigureOut">
               <a:rPr lang="en-US" smtClean="0"/>
-              <a:t>1/17/2019</a:t>
+              <a:t>2/1/2019</a:t>
             </a:fld>
             <a:endParaRPr lang="en-US"/>
           </a:p>
@@ -771,7 +772,7 @@
           <a:p>
             <a:fld id="{BD371D8B-6EEF-4666-9EDE-D125F1A89B84}" type="datetimeFigureOut">
               <a:rPr lang="en-US" smtClean="0"/>
-              <a:t>1/17/2019</a:t>
+              <a:t>2/1/2019</a:t>
             </a:fld>
             <a:endParaRPr lang="en-US"/>
           </a:p>
@@ -1016,7 +1017,7 @@
           <a:p>
             <a:fld id="{BD371D8B-6EEF-4666-9EDE-D125F1A89B84}" type="datetimeFigureOut">
               <a:rPr lang="en-US" smtClean="0"/>
-              <a:t>1/17/2019</a:t>
+              <a:t>2/1/2019</a:t>
             </a:fld>
             <a:endParaRPr lang="en-US"/>
           </a:p>
@@ -1245,7 +1246,7 @@
           <a:p>
             <a:fld id="{BD371D8B-6EEF-4666-9EDE-D125F1A89B84}" type="datetimeFigureOut">
               <a:rPr lang="en-US" smtClean="0"/>
-              <a:t>1/17/2019</a:t>
+              <a:t>2/1/2019</a:t>
             </a:fld>
             <a:endParaRPr lang="en-US"/>
           </a:p>
@@ -1609,7 +1610,7 @@
           <a:p>
             <a:fld id="{BD371D8B-6EEF-4666-9EDE-D125F1A89B84}" type="datetimeFigureOut">
               <a:rPr lang="en-US" smtClean="0"/>
-              <a:t>1/17/2019</a:t>
+              <a:t>2/1/2019</a:t>
             </a:fld>
             <a:endParaRPr lang="en-US"/>
           </a:p>
@@ -1726,7 +1727,7 @@
           <a:p>
             <a:fld id="{BD371D8B-6EEF-4666-9EDE-D125F1A89B84}" type="datetimeFigureOut">
               <a:rPr lang="en-US" smtClean="0"/>
-              <a:t>1/17/2019</a:t>
+              <a:t>2/1/2019</a:t>
             </a:fld>
             <a:endParaRPr lang="en-US"/>
           </a:p>
@@ -1821,7 +1822,7 @@
           <a:p>
             <a:fld id="{BD371D8B-6EEF-4666-9EDE-D125F1A89B84}" type="datetimeFigureOut">
               <a:rPr lang="en-US" smtClean="0"/>
-              <a:t>1/17/2019</a:t>
+              <a:t>2/1/2019</a:t>
             </a:fld>
             <a:endParaRPr lang="en-US"/>
           </a:p>
@@ -2096,7 +2097,7 @@
           <a:p>
             <a:fld id="{BD371D8B-6EEF-4666-9EDE-D125F1A89B84}" type="datetimeFigureOut">
               <a:rPr lang="en-US" smtClean="0"/>
-              <a:t>1/17/2019</a:t>
+              <a:t>2/1/2019</a:t>
             </a:fld>
             <a:endParaRPr lang="en-US"/>
           </a:p>
@@ -2348,7 +2349,7 @@
           <a:p>
             <a:fld id="{BD371D8B-6EEF-4666-9EDE-D125F1A89B84}" type="datetimeFigureOut">
               <a:rPr lang="en-US" smtClean="0"/>
-              <a:t>1/17/2019</a:t>
+              <a:t>2/1/2019</a:t>
             </a:fld>
             <a:endParaRPr lang="en-US"/>
           </a:p>
@@ -2559,7 +2560,7 @@
           <a:p>
             <a:fld id="{BD371D8B-6EEF-4666-9EDE-D125F1A89B84}" type="datetimeFigureOut">
               <a:rPr lang="en-US" smtClean="0"/>
-              <a:t>1/17/2019</a:t>
+              <a:t>2/1/2019</a:t>
             </a:fld>
             <a:endParaRPr lang="en-US"/>
           </a:p>
@@ -6323,6 +6324,112 @@
           <a:p>
             <a:r>
               <a:rPr lang="en-US" dirty="0"/>
+              <a:t>Search Keyword Processing</a:t>
+            </a:r>
+          </a:p>
+        </p:txBody>
+      </p:sp>
+      <p:sp>
+        <p:nvSpPr>
+          <p:cNvPr id="3" name="Content Placeholder 2"/>
+          <p:cNvSpPr>
+            <a:spLocks noGrp="1"/>
+          </p:cNvSpPr>
+          <p:nvPr>
+            <p:ph idx="1"/>
+          </p:nvPr>
+        </p:nvSpPr>
+        <p:spPr/>
+        <p:txBody>
+          <a:bodyPr>
+            <a:normAutofit/>
+          </a:bodyPr>
+          <a:lstStyle/>
+          <a:p>
+            <a:r>
+              <a:rPr lang="en-US" dirty="0"/>
+              <a:t>Label includes exact words </a:t>
+            </a:r>
+          </a:p>
+          <a:p>
+            <a:r>
+              <a:rPr lang="en-US" dirty="0"/>
+              <a:t>Page title includes exact words </a:t>
+            </a:r>
+          </a:p>
+          <a:p>
+            <a:r>
+              <a:rPr lang="en-US" dirty="0"/>
+              <a:t>Contents include exact words</a:t>
+            </a:r>
+          </a:p>
+          <a:p>
+            <a:r>
+              <a:rPr lang="en-US" dirty="0"/>
+              <a:t>Label includes one of the words </a:t>
+            </a:r>
+          </a:p>
+          <a:p>
+            <a:r>
+              <a:rPr lang="en-US" dirty="0"/>
+              <a:t>Page title includes one of the words</a:t>
+            </a:r>
+          </a:p>
+          <a:p>
+            <a:r>
+              <a:rPr lang="en-US" dirty="0"/>
+              <a:t>Contents include one of the words. </a:t>
+            </a:r>
+          </a:p>
+        </p:txBody>
+      </p:sp>
+    </p:spTree>
+    <p:extLst>
+      <p:ext uri="{BB962C8B-B14F-4D97-AF65-F5344CB8AC3E}">
+        <p14:creationId xmlns:p14="http://schemas.microsoft.com/office/powerpoint/2010/main" val="965072225"/>
+      </p:ext>
+    </p:extLst>
+  </p:cSld>
+  <p:clrMapOvr>
+    <a:masterClrMapping/>
+  </p:clrMapOvr>
+</p:sld>
+</file>
+
+<file path=ppt/slides/slide7.xml><?xml version="1.0" encoding="utf-8"?>
+<p:sld xmlns:a="http://schemas.openxmlformats.org/drawingml/2006/main" xmlns:r="http://schemas.openxmlformats.org/officeDocument/2006/relationships" xmlns:p="http://schemas.openxmlformats.org/presentationml/2006/main">
+  <p:cSld>
+    <p:spTree>
+      <p:nvGrpSpPr>
+        <p:cNvPr id="1" name=""/>
+        <p:cNvGrpSpPr/>
+        <p:nvPr/>
+      </p:nvGrpSpPr>
+      <p:grpSpPr>
+        <a:xfrm>
+          <a:off x="0" y="0"/>
+          <a:ext cx="0" cy="0"/>
+          <a:chOff x="0" y="0"/>
+          <a:chExt cx="0" cy="0"/>
+        </a:xfrm>
+      </p:grpSpPr>
+      <p:sp>
+        <p:nvSpPr>
+          <p:cNvPr id="2" name="Title 1"/>
+          <p:cNvSpPr>
+            <a:spLocks noGrp="1"/>
+          </p:cNvSpPr>
+          <p:nvPr>
+            <p:ph type="title"/>
+          </p:nvPr>
+        </p:nvSpPr>
+        <p:spPr/>
+        <p:txBody>
+          <a:bodyPr/>
+          <a:lstStyle/>
+          <a:p>
+            <a:r>
+              <a:rPr lang="en-US" dirty="0"/>
               <a:t>Tips</a:t>
             </a:r>
           </a:p>

</xml_diff>